<commit_message>
update comment and pictures
</commit_message>
<xml_diff>
--- a/User manual/User manual.pptx
+++ b/User manual/User manual.pptx
@@ -15,14 +15,16 @@
     <p:sldId id="266" r:id="rId9"/>
     <p:sldId id="268" r:id="rId10"/>
     <p:sldId id="270" r:id="rId11"/>
-    <p:sldId id="269" r:id="rId12"/>
-    <p:sldId id="271" r:id="rId13"/>
-    <p:sldId id="277" r:id="rId14"/>
-    <p:sldId id="272" r:id="rId15"/>
-    <p:sldId id="273" r:id="rId16"/>
-    <p:sldId id="274" r:id="rId17"/>
-    <p:sldId id="275" r:id="rId18"/>
-    <p:sldId id="278" r:id="rId19"/>
+    <p:sldId id="279" r:id="rId12"/>
+    <p:sldId id="269" r:id="rId13"/>
+    <p:sldId id="271" r:id="rId14"/>
+    <p:sldId id="280" r:id="rId15"/>
+    <p:sldId id="277" r:id="rId16"/>
+    <p:sldId id="272" r:id="rId17"/>
+    <p:sldId id="273" r:id="rId18"/>
+    <p:sldId id="274" r:id="rId19"/>
+    <p:sldId id="275" r:id="rId20"/>
+    <p:sldId id="278" r:id="rId21"/>
   </p:sldIdLst>
   <p:sldSz cx="12192000" cy="6858000"/>
   <p:notesSz cx="6858000" cy="9144000"/>
@@ -121,13 +123,18 @@
       </a:defRPr>
     </a:lvl9pPr>
   </p:defaultTextStyle>
+  <p:extLst>
+    <p:ext uri="{EFAFB233-063F-42B5-8137-9DF3F51BA10A}">
+      <p15:sldGuideLst xmlns:p15="http://schemas.microsoft.com/office/powerpoint/2012/main"/>
+    </p:ext>
+  </p:extLst>
 </p:presentation>
 </file>
 
 <file path=ppt/revisionInfo.xml><?xml version="1.0" encoding="utf-8"?>
 <p1510:revInfo xmlns:a="http://schemas.openxmlformats.org/drawingml/2006/main" xmlns:r="http://schemas.openxmlformats.org/officeDocument/2006/relationships" xmlns:p1510="http://schemas.microsoft.com/office/powerpoint/2015/10/main">
   <p1510:revLst>
-    <p1510:client id="{B7AF1057-D8A7-4981-81EF-999A3A9534D4}" v="3207" dt="2018-06-27T16:43:15.267"/>
+    <p1510:client id="{B7AF1057-D8A7-4981-81EF-999A3A9534D4}" v="3261" dt="2018-06-28T14:58:01.826"/>
   </p1510:revLst>
 </p1510:revInfo>
 </file>
@@ -137,7 +144,7 @@
   <pc:docChgLst>
     <pc:chgData name="김 택서" userId="6550baa756378846" providerId="LiveId" clId="{B7AF1057-D8A7-4981-81EF-999A3A9534D4}"/>
     <pc:docChg chg="undo redo custSel addSld delSld modSld sldOrd">
-      <pc:chgData name="김 택서" userId="6550baa756378846" providerId="LiveId" clId="{B7AF1057-D8A7-4981-81EF-999A3A9534D4}" dt="2018-06-27T16:43:15.267" v="3206" actId="1076"/>
+      <pc:chgData name="김 택서" userId="6550baa756378846" providerId="LiveId" clId="{B7AF1057-D8A7-4981-81EF-999A3A9534D4}" dt="2018-06-28T14:58:01.826" v="3260" actId="20577"/>
       <pc:docMkLst>
         <pc:docMk/>
       </pc:docMkLst>
@@ -205,7 +212,7 @@
         </pc:picChg>
       </pc:sldChg>
       <pc:sldChg chg="addSp delSp modSp add del modTransition">
-        <pc:chgData name="김 택서" userId="6550baa756378846" providerId="LiveId" clId="{B7AF1057-D8A7-4981-81EF-999A3A9534D4}" dt="2018-06-27T16:31:44.868" v="3050"/>
+        <pc:chgData name="김 택서" userId="6550baa756378846" providerId="LiveId" clId="{B7AF1057-D8A7-4981-81EF-999A3A9534D4}" dt="2018-06-28T14:48:04.700" v="3224" actId="20577"/>
         <pc:sldMkLst>
           <pc:docMk/>
           <pc:sldMk cId="561613517" sldId="257"/>
@@ -218,8 +225,8 @@
             <ac:spMk id="3" creationId="{4FF37348-6D8A-4E5B-BC95-2CFF297E8A27}"/>
           </ac:spMkLst>
         </pc:spChg>
-        <pc:spChg chg="add">
-          <ac:chgData name="김 택서" userId="6550baa756378846" providerId="LiveId" clId="{B7AF1057-D8A7-4981-81EF-999A3A9534D4}" dt="2018-06-27T16:31:44.868" v="3050"/>
+        <pc:spChg chg="add mod">
+          <ac:chgData name="김 택서" userId="6550baa756378846" providerId="LiveId" clId="{B7AF1057-D8A7-4981-81EF-999A3A9534D4}" dt="2018-06-28T14:48:04.700" v="3224" actId="20577"/>
           <ac:spMkLst>
             <pc:docMk/>
             <pc:sldMk cId="561613517" sldId="257"/>
@@ -227,8 +234,8 @@
           </ac:spMkLst>
         </pc:spChg>
       </pc:sldChg>
-      <pc:sldChg chg="addSp delSp modTransition">
-        <pc:chgData name="김 택서" userId="6550baa756378846" providerId="LiveId" clId="{B7AF1057-D8A7-4981-81EF-999A3A9534D4}" dt="2018-06-27T16:31:41.694" v="3048"/>
+      <pc:sldChg chg="addSp delSp modSp modTransition">
+        <pc:chgData name="김 택서" userId="6550baa756378846" providerId="LiveId" clId="{B7AF1057-D8A7-4981-81EF-999A3A9534D4}" dt="2018-06-28T14:48:17.259" v="3228"/>
         <pc:sldMkLst>
           <pc:docMk/>
           <pc:sldMk cId="2656042596" sldId="258"/>
@@ -241,17 +248,25 @@
             <ac:spMk id="3" creationId="{449FD179-5225-495D-865F-AF10A917CBE7}"/>
           </ac:spMkLst>
         </pc:spChg>
-        <pc:spChg chg="add">
-          <ac:chgData name="김 택서" userId="6550baa756378846" providerId="LiveId" clId="{B7AF1057-D8A7-4981-81EF-999A3A9534D4}" dt="2018-06-27T16:31:41.694" v="3048"/>
+        <pc:spChg chg="add del mod">
+          <ac:chgData name="김 택서" userId="6550baa756378846" providerId="LiveId" clId="{B7AF1057-D8A7-4981-81EF-999A3A9534D4}" dt="2018-06-28T14:48:17.090" v="3227" actId="478"/>
           <ac:spMkLst>
             <pc:docMk/>
             <pc:sldMk cId="2656042596" sldId="258"/>
             <ac:spMk id="4" creationId="{23BA24F5-76E8-48D2-82EA-A56C6E95BABC}"/>
           </ac:spMkLst>
         </pc:spChg>
+        <pc:spChg chg="add">
+          <ac:chgData name="김 택서" userId="6550baa756378846" providerId="LiveId" clId="{B7AF1057-D8A7-4981-81EF-999A3A9534D4}" dt="2018-06-28T14:48:17.259" v="3228"/>
+          <ac:spMkLst>
+            <pc:docMk/>
+            <pc:sldMk cId="2656042596" sldId="258"/>
+            <ac:spMk id="5" creationId="{6BE4DB51-3C77-4F03-AEBA-B16FD219AE66}"/>
+          </ac:spMkLst>
+        </pc:spChg>
       </pc:sldChg>
       <pc:sldChg chg="addSp delSp modSp modTransition">
-        <pc:chgData name="김 택서" userId="6550baa756378846" providerId="LiveId" clId="{B7AF1057-D8A7-4981-81EF-999A3A9534D4}" dt="2018-06-27T16:31:36.062" v="3046"/>
+        <pc:chgData name="김 택서" userId="6550baa756378846" providerId="LiveId" clId="{B7AF1057-D8A7-4981-81EF-999A3A9534D4}" dt="2018-06-28T14:48:20.798" v="3230"/>
         <pc:sldMkLst>
           <pc:docMk/>
           <pc:sldMk cId="312912967" sldId="259"/>
@@ -264,12 +279,20 @@
             <ac:spMk id="3" creationId="{38F53B54-0F3E-451C-8804-BF1B426A9B70}"/>
           </ac:spMkLst>
         </pc:spChg>
-        <pc:spChg chg="add">
-          <ac:chgData name="김 택서" userId="6550baa756378846" providerId="LiveId" clId="{B7AF1057-D8A7-4981-81EF-999A3A9534D4}" dt="2018-06-27T16:31:36.062" v="3046"/>
+        <pc:spChg chg="add del">
+          <ac:chgData name="김 택서" userId="6550baa756378846" providerId="LiveId" clId="{B7AF1057-D8A7-4981-81EF-999A3A9534D4}" dt="2018-06-28T14:48:20.622" v="3229" actId="478"/>
           <ac:spMkLst>
             <pc:docMk/>
             <pc:sldMk cId="312912967" sldId="259"/>
             <ac:spMk id="4" creationId="{AF711EB8-814C-42F2-A71B-59804737D1B9}"/>
+          </ac:spMkLst>
+        </pc:spChg>
+        <pc:spChg chg="add">
+          <ac:chgData name="김 택서" userId="6550baa756378846" providerId="LiveId" clId="{B7AF1057-D8A7-4981-81EF-999A3A9534D4}" dt="2018-06-28T14:48:20.798" v="3230"/>
+          <ac:spMkLst>
+            <pc:docMk/>
+            <pc:sldMk cId="312912967" sldId="259"/>
+            <ac:spMk id="5" creationId="{82F8D1B6-25DA-472D-A05D-FAA7C4AF472D}"/>
           </ac:spMkLst>
         </pc:spChg>
       </pc:sldChg>
@@ -280,7 +303,7 @@
           <pc:sldMk cId="1203881502" sldId="263"/>
         </pc:sldMkLst>
         <pc:spChg chg="add">
-          <ac:chgData name="김 택서" userId="6550baa756378846" providerId="LiveId" clId="{B7AF1057-D8A7-4981-81EF-999A3A9534D4}" dt="2018-06-27T15:51:45.448" v="760"/>
+          <ac:chgData name="김 택서" userId="6550baa756378846" providerId="LiveId" clId="{B7AF1057-D8A7-4981-81EF-999A3A9534D4}" dt="2018-06-27T15:51:45.448" v="760" actId="2696"/>
           <ac:spMkLst>
             <pc:docMk/>
             <pc:sldMk cId="1203881502" sldId="263"/>
@@ -288,18 +311,26 @@
           </ac:spMkLst>
         </pc:spChg>
       </pc:sldChg>
-      <pc:sldChg chg="addSp modSp modTransition">
-        <pc:chgData name="김 택서" userId="6550baa756378846" providerId="LiveId" clId="{B7AF1057-D8A7-4981-81EF-999A3A9534D4}" dt="2018-06-27T16:31:24.715" v="3044" actId="207"/>
+      <pc:sldChg chg="addSp delSp modSp modTransition">
+        <pc:chgData name="김 택서" userId="6550baa756378846" providerId="LiveId" clId="{B7AF1057-D8A7-4981-81EF-999A3A9534D4}" dt="2018-06-28T14:48:23.758" v="3232"/>
         <pc:sldMkLst>
           <pc:docMk/>
           <pc:sldMk cId="1008541846" sldId="264"/>
         </pc:sldMkLst>
-        <pc:spChg chg="add mod">
-          <ac:chgData name="김 택서" userId="6550baa756378846" providerId="LiveId" clId="{B7AF1057-D8A7-4981-81EF-999A3A9534D4}" dt="2018-06-27T16:31:24.715" v="3044" actId="207"/>
+        <pc:spChg chg="add del mod">
+          <ac:chgData name="김 택서" userId="6550baa756378846" providerId="LiveId" clId="{B7AF1057-D8A7-4981-81EF-999A3A9534D4}" dt="2018-06-28T14:48:23.577" v="3231" actId="478"/>
           <ac:spMkLst>
             <pc:docMk/>
             <pc:sldMk cId="1008541846" sldId="264"/>
             <ac:spMk id="3" creationId="{6EE5FBDA-112D-4F0F-9AA5-1F53E76C16CD}"/>
+          </ac:spMkLst>
+        </pc:spChg>
+        <pc:spChg chg="add">
+          <ac:chgData name="김 택서" userId="6550baa756378846" providerId="LiveId" clId="{B7AF1057-D8A7-4981-81EF-999A3A9534D4}" dt="2018-06-28T14:48:23.758" v="3232"/>
+          <ac:spMkLst>
+            <pc:docMk/>
+            <pc:sldMk cId="1008541846" sldId="264"/>
+            <ac:spMk id="4" creationId="{CF02EC8B-1D49-4071-83EB-2E998A907B9D}"/>
           </ac:spMkLst>
         </pc:spChg>
       </pc:sldChg>
@@ -318,23 +349,39 @@
           </ac:spMkLst>
         </pc:spChg>
       </pc:sldChg>
-      <pc:sldChg chg="addSp modSp modTransition">
-        <pc:chgData name="김 택서" userId="6550baa756378846" providerId="LiveId" clId="{B7AF1057-D8A7-4981-81EF-999A3A9534D4}" dt="2018-06-27T16:31:21.462" v="3043" actId="207"/>
+      <pc:sldChg chg="addSp delSp modSp modTransition">
+        <pc:chgData name="김 택서" userId="6550baa756378846" providerId="LiveId" clId="{B7AF1057-D8A7-4981-81EF-999A3A9534D4}" dt="2018-06-28T14:56:29.480" v="3235" actId="207"/>
         <pc:sldMkLst>
           <pc:docMk/>
           <pc:sldMk cId="1716308976" sldId="267"/>
         </pc:sldMkLst>
-        <pc:spChg chg="add mod">
-          <ac:chgData name="김 택서" userId="6550baa756378846" providerId="LiveId" clId="{B7AF1057-D8A7-4981-81EF-999A3A9534D4}" dt="2018-06-27T16:31:21.462" v="3043" actId="207"/>
+        <pc:spChg chg="add del mod">
+          <ac:chgData name="김 택서" userId="6550baa756378846" providerId="LiveId" clId="{B7AF1057-D8A7-4981-81EF-999A3A9534D4}" dt="2018-06-28T14:48:26.957" v="3233" actId="478"/>
           <ac:spMkLst>
             <pc:docMk/>
             <pc:sldMk cId="1716308976" sldId="267"/>
             <ac:spMk id="3" creationId="{4688CD47-B9B4-43C4-86A9-CA23986D2703}"/>
           </ac:spMkLst>
         </pc:spChg>
+        <pc:spChg chg="add">
+          <ac:chgData name="김 택서" userId="6550baa756378846" providerId="LiveId" clId="{B7AF1057-D8A7-4981-81EF-999A3A9534D4}" dt="2018-06-28T14:48:27.082" v="3234"/>
+          <ac:spMkLst>
+            <pc:docMk/>
+            <pc:sldMk cId="1716308976" sldId="267"/>
+            <ac:spMk id="4" creationId="{577B5A72-3031-4C1F-86A8-16812F9C7063}"/>
+          </ac:spMkLst>
+        </pc:spChg>
+        <pc:spChg chg="mod">
+          <ac:chgData name="김 택서" userId="6550baa756378846" providerId="LiveId" clId="{B7AF1057-D8A7-4981-81EF-999A3A9534D4}" dt="2018-06-28T14:56:29.480" v="3235" actId="207"/>
+          <ac:spMkLst>
+            <pc:docMk/>
+            <pc:sldMk cId="1716308976" sldId="267"/>
+            <ac:spMk id="6" creationId="{36F5D3F7-76FC-4B6A-A76A-CE1681F12470}"/>
+          </ac:spMkLst>
+        </pc:spChg>
       </pc:sldChg>
       <pc:sldChg chg="addSp modSp modTransition">
-        <pc:chgData name="김 택서" userId="6550baa756378846" providerId="LiveId" clId="{B7AF1057-D8A7-4981-81EF-999A3A9534D4}" dt="2018-06-27T16:31:14.290" v="3041" actId="207"/>
+        <pc:chgData name="김 택서" userId="6550baa756378846" providerId="LiveId" clId="{B7AF1057-D8A7-4981-81EF-999A3A9534D4}" dt="2018-06-28T14:56:42.792" v="3236" actId="207"/>
         <pc:sldMkLst>
           <pc:docMk/>
           <pc:sldMk cId="4026615798" sldId="268"/>
@@ -347,6 +394,14 @@
             <ac:spMk id="3" creationId="{5A6EB92A-B3B8-44E7-8732-D14B54387275}"/>
           </ac:spMkLst>
         </pc:spChg>
+        <pc:spChg chg="mod">
+          <ac:chgData name="김 택서" userId="6550baa756378846" providerId="LiveId" clId="{B7AF1057-D8A7-4981-81EF-999A3A9534D4}" dt="2018-06-28T14:56:42.792" v="3236" actId="207"/>
+          <ac:spMkLst>
+            <pc:docMk/>
+            <pc:sldMk cId="4026615798" sldId="268"/>
+            <ac:spMk id="6" creationId="{36F5D3F7-76FC-4B6A-A76A-CE1681F12470}"/>
+          </ac:spMkLst>
+        </pc:spChg>
       </pc:sldChg>
       <pc:sldChg chg="addSp delSp modSp modTransition">
         <pc:chgData name="김 택서" userId="6550baa756378846" providerId="LiveId" clId="{B7AF1057-D8A7-4981-81EF-999A3A9534D4}" dt="2018-06-27T16:31:06.246" v="3039" actId="207"/>
@@ -355,7 +410,7 @@
           <pc:sldMk cId="1740080672" sldId="269"/>
         </pc:sldMkLst>
         <pc:spChg chg="add del">
-          <ac:chgData name="김 택서" userId="6550baa756378846" providerId="LiveId" clId="{B7AF1057-D8A7-4981-81EF-999A3A9534D4}" dt="2018-06-27T16:11:22.441" v="1466"/>
+          <ac:chgData name="김 택서" userId="6550baa756378846" providerId="LiveId" clId="{B7AF1057-D8A7-4981-81EF-999A3A9534D4}" dt="2018-06-27T16:11:22.441" v="1466" actId="207"/>
           <ac:spMkLst>
             <pc:docMk/>
             <pc:sldMk cId="1740080672" sldId="269"/>
@@ -371,12 +426,28 @@
           </ac:spMkLst>
         </pc:spChg>
       </pc:sldChg>
-      <pc:sldChg chg="addSp modSp modTransition">
-        <pc:chgData name="김 택서" userId="6550baa756378846" providerId="LiveId" clId="{B7AF1057-D8A7-4981-81EF-999A3A9534D4}" dt="2018-06-27T16:31:09.371" v="3040" actId="207"/>
+      <pc:sldChg chg="addSp delSp modSp modTransition">
+        <pc:chgData name="김 택서" userId="6550baa756378846" providerId="LiveId" clId="{B7AF1057-D8A7-4981-81EF-999A3A9534D4}" dt="2018-06-28T14:56:56.875" v="3239" actId="478"/>
         <pc:sldMkLst>
           <pc:docMk/>
           <pc:sldMk cId="825998681" sldId="270"/>
         </pc:sldMkLst>
+        <pc:spChg chg="del">
+          <ac:chgData name="김 택서" userId="6550baa756378846" providerId="LiveId" clId="{B7AF1057-D8A7-4981-81EF-999A3A9534D4}" dt="2018-06-28T14:56:56.875" v="3239" actId="478"/>
+          <ac:spMkLst>
+            <pc:docMk/>
+            <pc:sldMk cId="825998681" sldId="270"/>
+            <ac:spMk id="4" creationId="{B27F7B09-0F1B-4A77-99F0-C9D35D26AB08}"/>
+          </ac:spMkLst>
+        </pc:spChg>
+        <pc:spChg chg="mod">
+          <ac:chgData name="김 택서" userId="6550baa756378846" providerId="LiveId" clId="{B7AF1057-D8A7-4981-81EF-999A3A9534D4}" dt="2018-06-28T14:56:54.303" v="3238" actId="207"/>
+          <ac:spMkLst>
+            <pc:docMk/>
+            <pc:sldMk cId="825998681" sldId="270"/>
+            <ac:spMk id="6" creationId="{36F5D3F7-76FC-4B6A-A76A-CE1681F12470}"/>
+          </ac:spMkLst>
+        </pc:spChg>
         <pc:spChg chg="add mod">
           <ac:chgData name="김 택서" userId="6550baa756378846" providerId="LiveId" clId="{B7AF1057-D8A7-4981-81EF-999A3A9534D4}" dt="2018-06-27T16:31:09.371" v="3040" actId="207"/>
           <ac:spMkLst>
@@ -393,7 +464,7 @@
           <pc:sldMk cId="1031476174" sldId="271"/>
         </pc:sldMkLst>
         <pc:spChg chg="add del">
-          <ac:chgData name="김 택서" userId="6550baa756378846" providerId="LiveId" clId="{B7AF1057-D8A7-4981-81EF-999A3A9534D4}" dt="2018-06-27T16:13:25.522" v="1753"/>
+          <ac:chgData name="김 택서" userId="6550baa756378846" providerId="LiveId" clId="{B7AF1057-D8A7-4981-81EF-999A3A9534D4}" dt="2018-06-27T16:13:25.522" v="1753" actId="20577"/>
           <ac:spMkLst>
             <pc:docMk/>
             <pc:sldMk cId="1031476174" sldId="271"/>
@@ -433,7 +504,7 @@
         </pc:spChg>
       </pc:sldChg>
       <pc:sldChg chg="addSp modSp modTransition">
-        <pc:chgData name="김 택서" userId="6550baa756378846" providerId="LiveId" clId="{B7AF1057-D8A7-4981-81EF-999A3A9534D4}" dt="2018-06-27T16:30:53.153" v="3035" actId="207"/>
+        <pc:chgData name="김 택서" userId="6550baa756378846" providerId="LiveId" clId="{B7AF1057-D8A7-4981-81EF-999A3A9534D4}" dt="2018-06-28T14:57:46.059" v="3244" actId="207"/>
         <pc:sldMkLst>
           <pc:docMk/>
           <pc:sldMk cId="1153938121" sldId="273"/>
@@ -444,6 +515,14 @@
             <pc:docMk/>
             <pc:sldMk cId="1153938121" sldId="273"/>
             <ac:spMk id="3" creationId="{FF5DF127-FE3A-4877-8898-D1769B07BED7}"/>
+          </ac:spMkLst>
+        </pc:spChg>
+        <pc:spChg chg="mod">
+          <ac:chgData name="김 택서" userId="6550baa756378846" providerId="LiveId" clId="{B7AF1057-D8A7-4981-81EF-999A3A9534D4}" dt="2018-06-28T14:57:46.059" v="3244" actId="207"/>
+          <ac:spMkLst>
+            <pc:docMk/>
+            <pc:sldMk cId="1153938121" sldId="273"/>
+            <ac:spMk id="6" creationId="{36F5D3F7-76FC-4B6A-A76A-CE1681F12470}"/>
           </ac:spMkLst>
         </pc:spChg>
       </pc:sldChg>
@@ -493,13 +572,13 @@
         </pc:spChg>
       </pc:sldChg>
       <pc:sldChg chg="addSp delSp modSp add modTransition">
-        <pc:chgData name="김 택서" userId="6550baa756378846" providerId="LiveId" clId="{B7AF1057-D8A7-4981-81EF-999A3A9534D4}" dt="2018-06-27T16:34:28.470" v="3154" actId="20577"/>
+        <pc:chgData name="김 택서" userId="6550baa756378846" providerId="LiveId" clId="{B7AF1057-D8A7-4981-81EF-999A3A9534D4}" dt="2018-06-28T14:57:23.198" v="3243" actId="207"/>
         <pc:sldMkLst>
           <pc:docMk/>
           <pc:sldMk cId="4230585897" sldId="277"/>
         </pc:sldMkLst>
         <pc:spChg chg="add del">
-          <ac:chgData name="김 택서" userId="6550baa756378846" providerId="LiveId" clId="{B7AF1057-D8A7-4981-81EF-999A3A9534D4}" dt="2018-06-27T16:14:44.275" v="1850"/>
+          <ac:chgData name="김 택서" userId="6550baa756378846" providerId="LiveId" clId="{B7AF1057-D8A7-4981-81EF-999A3A9534D4}" dt="2018-06-27T16:14:44.275" v="1850" actId="20577"/>
           <ac:spMkLst>
             <pc:docMk/>
             <pc:sldMk cId="4230585897" sldId="277"/>
@@ -515,7 +594,7 @@
           </ac:spMkLst>
         </pc:spChg>
         <pc:spChg chg="mod">
-          <ac:chgData name="김 택서" userId="6550baa756378846" providerId="LiveId" clId="{B7AF1057-D8A7-4981-81EF-999A3A9534D4}" dt="2018-06-27T15:29:48.602" v="3" actId="207"/>
+          <ac:chgData name="김 택서" userId="6550baa756378846" providerId="LiveId" clId="{B7AF1057-D8A7-4981-81EF-999A3A9534D4}" dt="2018-06-28T14:57:23.198" v="3243" actId="207"/>
           <ac:spMkLst>
             <pc:docMk/>
             <pc:sldMk cId="4230585897" sldId="277"/>
@@ -540,13 +619,13 @@
         </pc:picChg>
       </pc:sldChg>
       <pc:sldChg chg="addSp delSp modSp add ord">
-        <pc:chgData name="김 택서" userId="6550baa756378846" providerId="LiveId" clId="{B7AF1057-D8A7-4981-81EF-999A3A9534D4}" dt="2018-06-27T16:43:15.267" v="3206" actId="1076"/>
+        <pc:chgData name="김 택서" userId="6550baa756378846" providerId="LiveId" clId="{B7AF1057-D8A7-4981-81EF-999A3A9534D4}" dt="2018-06-28T14:58:01.826" v="3260" actId="20577"/>
         <pc:sldMkLst>
           <pc:docMk/>
           <pc:sldMk cId="491048724" sldId="278"/>
         </pc:sldMkLst>
         <pc:spChg chg="add del">
-          <ac:chgData name="김 택서" userId="6550baa756378846" providerId="LiveId" clId="{B7AF1057-D8A7-4981-81EF-999A3A9534D4}" dt="2018-06-27T16:27:25.989" v="2868"/>
+          <ac:chgData name="김 택서" userId="6550baa756378846" providerId="LiveId" clId="{B7AF1057-D8A7-4981-81EF-999A3A9534D4}" dt="2018-06-27T16:27:25.989" v="2868" actId="1076"/>
           <ac:spMkLst>
             <pc:docMk/>
             <pc:sldMk cId="491048724" sldId="278"/>
@@ -554,7 +633,7 @@
           </ac:spMkLst>
         </pc:spChg>
         <pc:spChg chg="add mod">
-          <ac:chgData name="김 택서" userId="6550baa756378846" providerId="LiveId" clId="{B7AF1057-D8A7-4981-81EF-999A3A9534D4}" dt="2018-06-27T16:38:55.367" v="3160" actId="20577"/>
+          <ac:chgData name="김 택서" userId="6550baa756378846" providerId="LiveId" clId="{B7AF1057-D8A7-4981-81EF-999A3A9534D4}" dt="2018-06-28T14:58:01.826" v="3260" actId="20577"/>
           <ac:spMkLst>
             <pc:docMk/>
             <pc:sldMk cId="491048724" sldId="278"/>
@@ -575,6 +654,36 @@
             <pc:docMk/>
             <pc:sldMk cId="491048724" sldId="278"/>
             <ac:picMk id="5" creationId="{7917688F-928C-4B78-B202-BAB542A2517B}"/>
+          </ac:picMkLst>
+        </pc:picChg>
+      </pc:sldChg>
+      <pc:sldChg chg="add">
+        <pc:chgData name="김 택서" userId="6550baa756378846" providerId="LiveId" clId="{B7AF1057-D8A7-4981-81EF-999A3A9534D4}" dt="2018-06-28T14:56:47.288" v="3237"/>
+        <pc:sldMkLst>
+          <pc:docMk/>
+          <pc:sldMk cId="3449473901" sldId="279"/>
+        </pc:sldMkLst>
+      </pc:sldChg>
+      <pc:sldChg chg="delSp modSp add">
+        <pc:chgData name="김 택서" userId="6550baa756378846" providerId="LiveId" clId="{B7AF1057-D8A7-4981-81EF-999A3A9534D4}" dt="2018-06-28T14:57:13.909" v="3242" actId="207"/>
+        <pc:sldMkLst>
+          <pc:docMk/>
+          <pc:sldMk cId="4144643519" sldId="280"/>
+        </pc:sldMkLst>
+        <pc:spChg chg="mod">
+          <ac:chgData name="김 택서" userId="6550baa756378846" providerId="LiveId" clId="{B7AF1057-D8A7-4981-81EF-999A3A9534D4}" dt="2018-06-28T14:57:13.909" v="3242" actId="207"/>
+          <ac:spMkLst>
+            <pc:docMk/>
+            <pc:sldMk cId="4144643519" sldId="280"/>
+            <ac:spMk id="6" creationId="{36F5D3F7-76FC-4B6A-A76A-CE1681F12470}"/>
+          </ac:spMkLst>
+        </pc:spChg>
+        <pc:picChg chg="del">
+          <ac:chgData name="김 택서" userId="6550baa756378846" providerId="LiveId" clId="{B7AF1057-D8A7-4981-81EF-999A3A9534D4}" dt="2018-06-28T14:57:04.964" v="3241" actId="478"/>
+          <ac:picMkLst>
+            <pc:docMk/>
+            <pc:sldMk cId="4144643519" sldId="280"/>
+            <ac:picMk id="3" creationId="{FB327ABF-6B57-46B9-BE11-14B61F1AD0CA}"/>
           </ac:picMkLst>
         </pc:picChg>
       </pc:sldChg>
@@ -732,7 +841,7 @@
           <a:p>
             <a:fld id="{C26E2363-33EE-4CD3-80C7-24C076F94E39}" type="datetimeFigureOut">
               <a:rPr lang="en-US" smtClean="0"/>
-              <a:t>6/27/2018</a:t>
+              <a:t>6/28/2018</a:t>
             </a:fld>
             <a:endParaRPr lang="en-US"/>
           </a:p>
@@ -932,7 +1041,7 @@
           <a:p>
             <a:fld id="{C26E2363-33EE-4CD3-80C7-24C076F94E39}" type="datetimeFigureOut">
               <a:rPr lang="en-US" smtClean="0"/>
-              <a:t>6/27/2018</a:t>
+              <a:t>6/28/2018</a:t>
             </a:fld>
             <a:endParaRPr lang="en-US"/>
           </a:p>
@@ -1142,7 +1251,7 @@
           <a:p>
             <a:fld id="{C26E2363-33EE-4CD3-80C7-24C076F94E39}" type="datetimeFigureOut">
               <a:rPr lang="en-US" smtClean="0"/>
-              <a:t>6/27/2018</a:t>
+              <a:t>6/28/2018</a:t>
             </a:fld>
             <a:endParaRPr lang="en-US"/>
           </a:p>
@@ -1342,7 +1451,7 @@
           <a:p>
             <a:fld id="{C26E2363-33EE-4CD3-80C7-24C076F94E39}" type="datetimeFigureOut">
               <a:rPr lang="en-US" smtClean="0"/>
-              <a:t>6/27/2018</a:t>
+              <a:t>6/28/2018</a:t>
             </a:fld>
             <a:endParaRPr lang="en-US"/>
           </a:p>
@@ -1618,7 +1727,7 @@
           <a:p>
             <a:fld id="{C26E2363-33EE-4CD3-80C7-24C076F94E39}" type="datetimeFigureOut">
               <a:rPr lang="en-US" smtClean="0"/>
-              <a:t>6/27/2018</a:t>
+              <a:t>6/28/2018</a:t>
             </a:fld>
             <a:endParaRPr lang="en-US"/>
           </a:p>
@@ -1886,7 +1995,7 @@
           <a:p>
             <a:fld id="{C26E2363-33EE-4CD3-80C7-24C076F94E39}" type="datetimeFigureOut">
               <a:rPr lang="en-US" smtClean="0"/>
-              <a:t>6/27/2018</a:t>
+              <a:t>6/28/2018</a:t>
             </a:fld>
             <a:endParaRPr lang="en-US"/>
           </a:p>
@@ -2301,7 +2410,7 @@
           <a:p>
             <a:fld id="{C26E2363-33EE-4CD3-80C7-24C076F94E39}" type="datetimeFigureOut">
               <a:rPr lang="en-US" smtClean="0"/>
-              <a:t>6/27/2018</a:t>
+              <a:t>6/28/2018</a:t>
             </a:fld>
             <a:endParaRPr lang="en-US"/>
           </a:p>
@@ -2443,7 +2552,7 @@
           <a:p>
             <a:fld id="{C26E2363-33EE-4CD3-80C7-24C076F94E39}" type="datetimeFigureOut">
               <a:rPr lang="en-US" smtClean="0"/>
-              <a:t>6/27/2018</a:t>
+              <a:t>6/28/2018</a:t>
             </a:fld>
             <a:endParaRPr lang="en-US"/>
           </a:p>
@@ -2556,7 +2665,7 @@
           <a:p>
             <a:fld id="{C26E2363-33EE-4CD3-80C7-24C076F94E39}" type="datetimeFigureOut">
               <a:rPr lang="en-US" smtClean="0"/>
-              <a:t>6/27/2018</a:t>
+              <a:t>6/28/2018</a:t>
             </a:fld>
             <a:endParaRPr lang="en-US"/>
           </a:p>
@@ -2869,7 +2978,7 @@
           <a:p>
             <a:fld id="{C26E2363-33EE-4CD3-80C7-24C076F94E39}" type="datetimeFigureOut">
               <a:rPr lang="en-US" smtClean="0"/>
-              <a:t>6/27/2018</a:t>
+              <a:t>6/28/2018</a:t>
             </a:fld>
             <a:endParaRPr lang="en-US"/>
           </a:p>
@@ -3158,7 +3267,7 @@
           <a:p>
             <a:fld id="{C26E2363-33EE-4CD3-80C7-24C076F94E39}" type="datetimeFigureOut">
               <a:rPr lang="en-US" smtClean="0"/>
-              <a:t>6/27/2018</a:t>
+              <a:t>6/28/2018</a:t>
             </a:fld>
             <a:endParaRPr lang="en-US"/>
           </a:p>
@@ -3401,7 +3510,7 @@
           <a:p>
             <a:fld id="{C26E2363-33EE-4CD3-80C7-24C076F94E39}" type="datetimeFigureOut">
               <a:rPr lang="en-US" smtClean="0"/>
-              <a:t>6/27/2018</a:t>
+              <a:t>6/28/2018</a:t>
             </a:fld>
             <a:endParaRPr lang="en-US"/>
           </a:p>
@@ -4085,13 +4194,13 @@
   <p:clrMapOvr>
     <a:masterClrMapping/>
   </p:clrMapOvr>
-  <mc:AlternateContent xmlns:mc="http://schemas.openxmlformats.org/markup-compatibility/2006">
-    <mc:Choice xmlns:p159="http://schemas.microsoft.com/office/powerpoint/2015/09/main" Requires="p159">
+  <mc:AlternateContent xmlns:mc="http://schemas.openxmlformats.org/markup-compatibility/2006" xmlns:p159="http://schemas.microsoft.com/office/powerpoint/2015/09/main">
+    <mc:Choice Requires="p159">
       <p:transition spd="slow">
         <p159:morph option="byObject"/>
       </p:transition>
     </mc:Choice>
-    <mc:Fallback>
+    <mc:Fallback xmlns="">
       <p:transition spd="slow">
         <p:fade/>
       </p:transition>
@@ -4101,6 +4210,187 @@
 </file>
 
 <file path=ppt/slides/slide10.xml><?xml version="1.0" encoding="utf-8"?>
+<p:sld xmlns:a="http://schemas.openxmlformats.org/drawingml/2006/main" xmlns:r="http://schemas.openxmlformats.org/officeDocument/2006/relationships" xmlns:p="http://schemas.openxmlformats.org/presentationml/2006/main">
+  <p:cSld>
+    <p:spTree>
+      <p:nvGrpSpPr>
+        <p:cNvPr id="1" name=""/>
+        <p:cNvGrpSpPr/>
+        <p:nvPr/>
+      </p:nvGrpSpPr>
+      <p:grpSpPr>
+        <a:xfrm>
+          <a:off x="0" y="0"/>
+          <a:ext cx="0" cy="0"/>
+          <a:chOff x="0" y="0"/>
+          <a:chExt cx="0" cy="0"/>
+        </a:xfrm>
+      </p:grpSpPr>
+      <p:sp>
+        <p:nvSpPr>
+          <p:cNvPr id="6" name="직사각형 5">
+            <a:extLst>
+              <a:ext uri="{FF2B5EF4-FFF2-40B4-BE49-F238E27FC236}">
+                <a16:creationId xmlns:a16="http://schemas.microsoft.com/office/drawing/2014/main" id="{36F5D3F7-76FC-4B6A-A76A-CE1681F12470}"/>
+              </a:ext>
+            </a:extLst>
+          </p:cNvPr>
+          <p:cNvSpPr/>
+          <p:nvPr/>
+        </p:nvSpPr>
+        <p:spPr>
+          <a:xfrm>
+            <a:off x="981075" y="0"/>
+            <a:ext cx="3848100" cy="6858000"/>
+          </a:xfrm>
+          <a:prstGeom prst="rect">
+            <a:avLst/>
+          </a:prstGeom>
+          <a:blipFill>
+            <a:blip r:embed="rId2"/>
+            <a:stretch>
+              <a:fillRect/>
+            </a:stretch>
+          </a:blipFill>
+          <a:ln>
+            <a:noFill/>
+          </a:ln>
+        </p:spPr>
+        <p:style>
+          <a:lnRef idx="2">
+            <a:schemeClr val="accent1">
+              <a:shade val="50000"/>
+            </a:schemeClr>
+          </a:lnRef>
+          <a:fillRef idx="1">
+            <a:schemeClr val="accent1"/>
+          </a:fillRef>
+          <a:effectRef idx="0">
+            <a:schemeClr val="accent1"/>
+          </a:effectRef>
+          <a:fontRef idx="minor">
+            <a:schemeClr val="lt1"/>
+          </a:fontRef>
+        </p:style>
+        <p:txBody>
+          <a:bodyPr rtlCol="0" anchor="ctr"/>
+          <a:lstStyle/>
+          <a:p>
+            <a:pPr algn="ctr"/>
+            <a:endParaRPr lang="en-US"/>
+          </a:p>
+        </p:txBody>
+      </p:sp>
+      <p:sp>
+        <p:nvSpPr>
+          <p:cNvPr id="7" name="TextBox 6">
+            <a:extLst>
+              <a:ext uri="{FF2B5EF4-FFF2-40B4-BE49-F238E27FC236}">
+                <a16:creationId xmlns:a16="http://schemas.microsoft.com/office/drawing/2014/main" id="{A4244A5B-28F3-4EE2-83ED-74B73BD638DC}"/>
+              </a:ext>
+            </a:extLst>
+          </p:cNvPr>
+          <p:cNvSpPr txBox="1"/>
+          <p:nvPr/>
+        </p:nvSpPr>
+        <p:spPr>
+          <a:xfrm>
+            <a:off x="5461000" y="1168400"/>
+            <a:ext cx="5243743" cy="923330"/>
+          </a:xfrm>
+          <a:prstGeom prst="rect">
+            <a:avLst/>
+          </a:prstGeom>
+          <a:noFill/>
+        </p:spPr>
+        <p:txBody>
+          <a:bodyPr wrap="none" rtlCol="0">
+            <a:spAutoFit/>
+          </a:bodyPr>
+          <a:lstStyle/>
+          <a:p>
+            <a:r>
+              <a:rPr lang="ko-KR" altLang="en-US" dirty="0" err="1">
+                <a:solidFill>
+                  <a:schemeClr val="tx1">
+                    <a:lumMod val="75000"/>
+                    <a:lumOff val="25000"/>
+                  </a:schemeClr>
+                </a:solidFill>
+              </a:rPr>
+              <a:t>메인화면에서</a:t>
+            </a:r>
+            <a:r>
+              <a:rPr lang="ko-KR" altLang="en-US" dirty="0">
+                <a:solidFill>
+                  <a:schemeClr val="tx1">
+                    <a:lumMod val="75000"/>
+                    <a:lumOff val="25000"/>
+                  </a:schemeClr>
+                </a:solidFill>
+              </a:rPr>
+              <a:t> 수업시간에 찍은 사진을 추가합니다</a:t>
+            </a:r>
+            <a:endParaRPr lang="en-US" altLang="ko-KR" dirty="0">
+              <a:solidFill>
+                <a:schemeClr val="tx1">
+                  <a:lumMod val="75000"/>
+                  <a:lumOff val="25000"/>
+                </a:schemeClr>
+              </a:solidFill>
+            </a:endParaRPr>
+          </a:p>
+          <a:p>
+            <a:endParaRPr lang="en-US" dirty="0">
+              <a:solidFill>
+                <a:schemeClr val="tx1">
+                  <a:lumMod val="75000"/>
+                  <a:lumOff val="25000"/>
+                </a:schemeClr>
+              </a:solidFill>
+            </a:endParaRPr>
+          </a:p>
+          <a:p>
+            <a:r>
+              <a:rPr lang="en-US" dirty="0">
+                <a:solidFill>
+                  <a:schemeClr val="tx1">
+                    <a:lumMod val="75000"/>
+                    <a:lumOff val="25000"/>
+                  </a:schemeClr>
+                </a:solidFill>
+              </a:rPr>
+              <a:t>Add photos taken in class time from the main screen</a:t>
+            </a:r>
+          </a:p>
+        </p:txBody>
+      </p:sp>
+    </p:spTree>
+    <p:extLst>
+      <p:ext uri="{BB962C8B-B14F-4D97-AF65-F5344CB8AC3E}">
+        <p14:creationId xmlns:p14="http://schemas.microsoft.com/office/powerpoint/2010/main" val="825998681"/>
+      </p:ext>
+    </p:extLst>
+  </p:cSld>
+  <p:clrMapOvr>
+    <a:masterClrMapping/>
+  </p:clrMapOvr>
+  <mc:AlternateContent xmlns:mc="http://schemas.openxmlformats.org/markup-compatibility/2006" xmlns:p159="http://schemas.microsoft.com/office/powerpoint/2015/09/main">
+    <mc:Choice Requires="p159">
+      <p:transition spd="med">
+        <p159:morph option="byObject"/>
+      </p:transition>
+    </mc:Choice>
+    <mc:Fallback xmlns="">
+      <p:transition spd="med">
+        <p:fade/>
+      </p:transition>
+    </mc:Fallback>
+  </mc:AlternateContent>
+</p:sld>
+</file>
+
+<file path=ppt/slides/slide11.xml><?xml version="1.0" encoding="utf-8"?>
 <p:sld xmlns:a="http://schemas.openxmlformats.org/drawingml/2006/main" xmlns:r="http://schemas.openxmlformats.org/officeDocument/2006/relationships" xmlns:p="http://schemas.openxmlformats.org/presentationml/2006/main">
   <p:cSld>
     <p:spTree>
@@ -4315,20 +4605,20 @@
     </p:spTree>
     <p:extLst>
       <p:ext uri="{BB962C8B-B14F-4D97-AF65-F5344CB8AC3E}">
-        <p14:creationId xmlns:p14="http://schemas.microsoft.com/office/powerpoint/2010/main" val="825998681"/>
+        <p14:creationId xmlns:p14="http://schemas.microsoft.com/office/powerpoint/2010/main" val="3449473901"/>
       </p:ext>
     </p:extLst>
   </p:cSld>
   <p:clrMapOvr>
     <a:masterClrMapping/>
   </p:clrMapOvr>
-  <mc:AlternateContent xmlns:mc="http://schemas.openxmlformats.org/markup-compatibility/2006">
-    <mc:Choice xmlns:p159="http://schemas.microsoft.com/office/powerpoint/2015/09/main" Requires="p159">
+  <mc:AlternateContent xmlns:mc="http://schemas.openxmlformats.org/markup-compatibility/2006" xmlns:p159="http://schemas.microsoft.com/office/powerpoint/2015/09/main">
+    <mc:Choice Requires="p159">
       <p:transition spd="med">
         <p159:morph option="byObject"/>
       </p:transition>
     </mc:Choice>
-    <mc:Fallback>
+    <mc:Fallback xmlns="">
       <p:transition spd="med">
         <p:fade/>
       </p:transition>
@@ -4337,7 +4627,7 @@
 </p:sld>
 </file>
 
-<file path=ppt/slides/slide11.xml><?xml version="1.0" encoding="utf-8"?>
+<file path=ppt/slides/slide12.xml><?xml version="1.0" encoding="utf-8"?>
 <p:sld xmlns:a="http://schemas.openxmlformats.org/drawingml/2006/main" xmlns:r="http://schemas.openxmlformats.org/officeDocument/2006/relationships" xmlns:p="http://schemas.openxmlformats.org/presentationml/2006/main">
   <p:cSld>
     <p:spTree>
@@ -4524,13 +4814,13 @@
   <p:clrMapOvr>
     <a:masterClrMapping/>
   </p:clrMapOvr>
-  <mc:AlternateContent xmlns:mc="http://schemas.openxmlformats.org/markup-compatibility/2006">
-    <mc:Choice xmlns:p159="http://schemas.microsoft.com/office/powerpoint/2015/09/main" Requires="p159">
+  <mc:AlternateContent xmlns:mc="http://schemas.openxmlformats.org/markup-compatibility/2006" xmlns:p159="http://schemas.microsoft.com/office/powerpoint/2015/09/main">
+    <mc:Choice Requires="p159">
       <p:transition spd="med">
         <p159:morph option="byObject"/>
       </p:transition>
     </mc:Choice>
-    <mc:Fallback>
+    <mc:Fallback xmlns="">
       <p:transition spd="med">
         <p:fade/>
       </p:transition>
@@ -4539,7 +4829,7 @@
 </p:sld>
 </file>
 
-<file path=ppt/slides/slide12.xml><?xml version="1.0" encoding="utf-8"?>
+<file path=ppt/slides/slide13.xml><?xml version="1.0" encoding="utf-8"?>
 <p:sld xmlns:a="http://schemas.openxmlformats.org/drawingml/2006/main" xmlns:r="http://schemas.openxmlformats.org/officeDocument/2006/relationships" xmlns:p="http://schemas.openxmlformats.org/presentationml/2006/main">
   <p:cSld>
     <p:spTree>
@@ -4738,13 +5028,13 @@
   <p:clrMapOvr>
     <a:masterClrMapping/>
   </p:clrMapOvr>
-  <mc:AlternateContent xmlns:mc="http://schemas.openxmlformats.org/markup-compatibility/2006">
-    <mc:Choice xmlns:p159="http://schemas.microsoft.com/office/powerpoint/2015/09/main" Requires="p159">
+  <mc:AlternateContent xmlns:mc="http://schemas.openxmlformats.org/markup-compatibility/2006" xmlns:p159="http://schemas.microsoft.com/office/powerpoint/2015/09/main">
+    <mc:Choice Requires="p159">
       <p:transition spd="med">
         <p159:morph option="byObject"/>
       </p:transition>
     </mc:Choice>
-    <mc:Fallback>
+    <mc:Fallback xmlns="">
       <p:transition spd="med">
         <p:fade/>
       </p:transition>
@@ -4753,7 +5043,7 @@
 </p:sld>
 </file>
 
-<file path=ppt/slides/slide13.xml><?xml version="1.0" encoding="utf-8"?>
+<file path=ppt/slides/slide14.xml><?xml version="1.0" encoding="utf-8"?>
 <p:sld xmlns:a="http://schemas.openxmlformats.org/drawingml/2006/main" xmlns:r="http://schemas.openxmlformats.org/officeDocument/2006/relationships" xmlns:p="http://schemas.openxmlformats.org/presentationml/2006/main">
   <p:cSld>
     <p:spTree>
@@ -4830,7 +5120,7 @@
           <p:cNvPr id="7" name="TextBox 6">
             <a:extLst>
               <a:ext uri="{FF2B5EF4-FFF2-40B4-BE49-F238E27FC236}">
-                <a16:creationId xmlns:a16="http://schemas.microsoft.com/office/drawing/2014/main" id="{4CD0A088-6320-4C4F-A374-81EB812F1667}"/>
+                <a16:creationId xmlns:a16="http://schemas.microsoft.com/office/drawing/2014/main" id="{8E2425C9-B5FA-410D-8178-1C80CBAD5D65}"/>
               </a:ext>
             </a:extLst>
           </p:cNvPr>
@@ -4839,8 +5129,8 @@
         </p:nvSpPr>
         <p:spPr>
           <a:xfrm>
-            <a:off x="5461000" y="1168400"/>
-            <a:ext cx="5296643" cy="923330"/>
+            <a:off x="6858000" y="1168400"/>
+            <a:ext cx="4887877" cy="923330"/>
           </a:xfrm>
           <a:prstGeom prst="rect">
             <a:avLst/>
@@ -4862,126 +5152,7 @@
                   </a:schemeClr>
                 </a:solidFill>
               </a:rPr>
-              <a:t>과목의 </a:t>
-            </a:r>
-            <a:r>
-              <a:rPr lang="ko-KR" altLang="en-US" dirty="0" err="1">
-                <a:solidFill>
-                  <a:schemeClr val="tx1">
-                    <a:lumMod val="75000"/>
-                    <a:lumOff val="25000"/>
-                  </a:schemeClr>
-                </a:solidFill>
-              </a:rPr>
-              <a:t>메뉴탭에서</a:t>
-            </a:r>
-            <a:r>
-              <a:rPr lang="ko-KR" altLang="en-US" dirty="0">
-                <a:solidFill>
-                  <a:schemeClr val="tx1">
-                    <a:lumMod val="75000"/>
-                    <a:lumOff val="25000"/>
-                  </a:schemeClr>
-                </a:solidFill>
-              </a:rPr>
-              <a:t> 과목속성을 수정할 수 있습니다</a:t>
-            </a:r>
-            <a:endParaRPr lang="en-US" altLang="ko-KR" dirty="0">
-              <a:solidFill>
-                <a:schemeClr val="tx1">
-                  <a:lumMod val="75000"/>
-                  <a:lumOff val="25000"/>
-                </a:schemeClr>
-              </a:solidFill>
-            </a:endParaRPr>
-          </a:p>
-          <a:p>
-            <a:endParaRPr lang="en-US" altLang="ko-KR" dirty="0">
-              <a:solidFill>
-                <a:schemeClr val="tx1">
-                  <a:lumMod val="75000"/>
-                  <a:lumOff val="25000"/>
-                </a:schemeClr>
-              </a:solidFill>
-            </a:endParaRPr>
-          </a:p>
-          <a:p>
-            <a:r>
-              <a:rPr lang="en-US" altLang="ko-KR" dirty="0">
-                <a:solidFill>
-                  <a:schemeClr val="tx1">
-                    <a:lumMod val="75000"/>
-                    <a:lumOff val="25000"/>
-                  </a:schemeClr>
-                </a:solidFill>
-              </a:rPr>
-              <a:t>Modify</a:t>
-            </a:r>
-            <a:r>
-              <a:rPr lang="ko-KR" altLang="en-US" dirty="0">
-                <a:solidFill>
-                  <a:schemeClr val="tx1">
-                    <a:lumMod val="75000"/>
-                    <a:lumOff val="25000"/>
-                  </a:schemeClr>
-                </a:solidFill>
-              </a:rPr>
-              <a:t> </a:t>
-            </a:r>
-            <a:r>
-              <a:rPr lang="en-US" altLang="ko-KR" dirty="0">
-                <a:solidFill>
-                  <a:schemeClr val="tx1">
-                    <a:lumMod val="75000"/>
-                    <a:lumOff val="25000"/>
-                  </a:schemeClr>
-                </a:solidFill>
-              </a:rPr>
-              <a:t>preference</a:t>
-            </a:r>
-            <a:r>
-              <a:rPr lang="ko-KR" altLang="en-US" dirty="0">
-                <a:solidFill>
-                  <a:schemeClr val="tx1">
-                    <a:lumMod val="75000"/>
-                    <a:lumOff val="25000"/>
-                  </a:schemeClr>
-                </a:solidFill>
-              </a:rPr>
-              <a:t> </a:t>
-            </a:r>
-            <a:r>
-              <a:rPr lang="en-US" altLang="ko-KR" dirty="0">
-                <a:solidFill>
-                  <a:schemeClr val="tx1">
-                    <a:lumMod val="75000"/>
-                    <a:lumOff val="25000"/>
-                  </a:schemeClr>
-                </a:solidFill>
-              </a:rPr>
-              <a:t>of</a:t>
-            </a:r>
-            <a:r>
-              <a:rPr lang="ko-KR" altLang="en-US" dirty="0">
-                <a:solidFill>
-                  <a:schemeClr val="tx1">
-                    <a:lumMod val="75000"/>
-                    <a:lumOff val="25000"/>
-                  </a:schemeClr>
-                </a:solidFill>
-              </a:rPr>
-              <a:t> </a:t>
-            </a:r>
-            <a:r>
-              <a:rPr lang="en-US" altLang="ko-KR" dirty="0">
-                <a:solidFill>
-                  <a:schemeClr val="tx1">
-                    <a:lumMod val="75000"/>
-                    <a:lumOff val="25000"/>
-                  </a:schemeClr>
-                </a:solidFill>
-              </a:rPr>
-              <a:t>subject on menu tap</a:t>
+              <a:t>분류된 사진들은 해당 과목에서 볼 수 있습니다</a:t>
             </a:r>
             <a:endParaRPr lang="en-US" dirty="0">
               <a:solidFill>
@@ -4992,25 +5163,48 @@
               </a:solidFill>
             </a:endParaRPr>
           </a:p>
+          <a:p>
+            <a:endParaRPr lang="en-US" dirty="0">
+              <a:solidFill>
+                <a:schemeClr val="tx1">
+                  <a:lumMod val="75000"/>
+                  <a:lumOff val="25000"/>
+                </a:schemeClr>
+              </a:solidFill>
+            </a:endParaRPr>
+          </a:p>
+          <a:p>
+            <a:r>
+              <a:rPr lang="en-US" dirty="0">
+                <a:solidFill>
+                  <a:schemeClr val="tx1">
+                    <a:lumMod val="75000"/>
+                    <a:lumOff val="25000"/>
+                  </a:schemeClr>
+                </a:solidFill>
+              </a:rPr>
+              <a:t>To see added pictures select subject on main page</a:t>
+            </a:r>
+          </a:p>
         </p:txBody>
       </p:sp>
     </p:spTree>
     <p:extLst>
       <p:ext uri="{BB962C8B-B14F-4D97-AF65-F5344CB8AC3E}">
-        <p14:creationId xmlns:p14="http://schemas.microsoft.com/office/powerpoint/2010/main" val="4230585897"/>
+        <p14:creationId xmlns:p14="http://schemas.microsoft.com/office/powerpoint/2010/main" val="4144643519"/>
       </p:ext>
     </p:extLst>
   </p:cSld>
   <p:clrMapOvr>
     <a:masterClrMapping/>
   </p:clrMapOvr>
-  <mc:AlternateContent xmlns:mc="http://schemas.openxmlformats.org/markup-compatibility/2006">
-    <mc:Choice xmlns:p159="http://schemas.microsoft.com/office/powerpoint/2015/09/main" Requires="p159">
+  <mc:AlternateContent xmlns:mc="http://schemas.openxmlformats.org/markup-compatibility/2006" xmlns:p159="http://schemas.microsoft.com/office/powerpoint/2015/09/main">
+    <mc:Choice Requires="p159">
       <p:transition spd="med">
         <p159:morph option="byObject"/>
       </p:transition>
     </mc:Choice>
-    <mc:Fallback>
+    <mc:Fallback xmlns="">
       <p:transition spd="med">
         <p:fade/>
       </p:transition>
@@ -5019,7 +5213,7 @@
 </p:sld>
 </file>
 
-<file path=ppt/slides/slide14.xml><?xml version="1.0" encoding="utf-8"?>
+<file path=ppt/slides/slide15.xml><?xml version="1.0" encoding="utf-8"?>
 <p:sld xmlns:a="http://schemas.openxmlformats.org/drawingml/2006/main" xmlns:r="http://schemas.openxmlformats.org/officeDocument/2006/relationships" xmlns:p="http://schemas.openxmlformats.org/presentationml/2006/main">
   <p:cSld>
     <p:spTree>
@@ -5093,10 +5287,10 @@
       </p:sp>
       <p:sp>
         <p:nvSpPr>
-          <p:cNvPr id="3" name="TextBox 2">
-            <a:extLst>
-              <a:ext uri="{FF2B5EF4-FFF2-40B4-BE49-F238E27FC236}">
-                <a16:creationId xmlns:a16="http://schemas.microsoft.com/office/drawing/2014/main" id="{2AE10DC9-F8CA-4729-9EDD-1D1AD539051A}"/>
+          <p:cNvPr id="7" name="TextBox 6">
+            <a:extLst>
+              <a:ext uri="{FF2B5EF4-FFF2-40B4-BE49-F238E27FC236}">
+                <a16:creationId xmlns:a16="http://schemas.microsoft.com/office/drawing/2014/main" id="{4CD0A088-6320-4C4F-A374-81EB812F1667}"/>
               </a:ext>
             </a:extLst>
           </p:cNvPr>
@@ -5106,7 +5300,7 @@
         <p:spPr>
           <a:xfrm>
             <a:off x="5461000" y="1168400"/>
-            <a:ext cx="3911648" cy="923330"/>
+            <a:ext cx="5296643" cy="923330"/>
           </a:xfrm>
           <a:prstGeom prst="rect">
             <a:avLst/>
@@ -5128,7 +5322,7 @@
                   </a:schemeClr>
                 </a:solidFill>
               </a:rPr>
-              <a:t>사진을 </a:t>
+              <a:t>과목의 </a:t>
             </a:r>
             <a:r>
               <a:rPr lang="ko-KR" altLang="en-US" dirty="0" err="1">
@@ -5139,7 +5333,7 @@
                   </a:schemeClr>
                 </a:solidFill>
               </a:rPr>
-              <a:t>탭하여</a:t>
+              <a:t>메뉴탭에서</a:t>
             </a:r>
             <a:r>
               <a:rPr lang="ko-KR" altLang="en-US" dirty="0">
@@ -5150,7 +5344,7 @@
                   </a:schemeClr>
                 </a:solidFill>
               </a:rPr>
-              <a:t> 사진을 볼 수 있습니다</a:t>
+              <a:t> 과목속성을 수정할 수 있습니다</a:t>
             </a:r>
             <a:endParaRPr lang="en-US" altLang="ko-KR" dirty="0">
               <a:solidFill>
@@ -5162,6 +5356,93 @@
             </a:endParaRPr>
           </a:p>
           <a:p>
+            <a:endParaRPr lang="en-US" altLang="ko-KR" dirty="0">
+              <a:solidFill>
+                <a:schemeClr val="tx1">
+                  <a:lumMod val="75000"/>
+                  <a:lumOff val="25000"/>
+                </a:schemeClr>
+              </a:solidFill>
+            </a:endParaRPr>
+          </a:p>
+          <a:p>
+            <a:r>
+              <a:rPr lang="en-US" altLang="ko-KR" dirty="0">
+                <a:solidFill>
+                  <a:schemeClr val="tx1">
+                    <a:lumMod val="75000"/>
+                    <a:lumOff val="25000"/>
+                  </a:schemeClr>
+                </a:solidFill>
+              </a:rPr>
+              <a:t>Modify</a:t>
+            </a:r>
+            <a:r>
+              <a:rPr lang="ko-KR" altLang="en-US" dirty="0">
+                <a:solidFill>
+                  <a:schemeClr val="tx1">
+                    <a:lumMod val="75000"/>
+                    <a:lumOff val="25000"/>
+                  </a:schemeClr>
+                </a:solidFill>
+              </a:rPr>
+              <a:t> </a:t>
+            </a:r>
+            <a:r>
+              <a:rPr lang="en-US" altLang="ko-KR" dirty="0">
+                <a:solidFill>
+                  <a:schemeClr val="tx1">
+                    <a:lumMod val="75000"/>
+                    <a:lumOff val="25000"/>
+                  </a:schemeClr>
+                </a:solidFill>
+              </a:rPr>
+              <a:t>preference</a:t>
+            </a:r>
+            <a:r>
+              <a:rPr lang="ko-KR" altLang="en-US" dirty="0">
+                <a:solidFill>
+                  <a:schemeClr val="tx1">
+                    <a:lumMod val="75000"/>
+                    <a:lumOff val="25000"/>
+                  </a:schemeClr>
+                </a:solidFill>
+              </a:rPr>
+              <a:t> </a:t>
+            </a:r>
+            <a:r>
+              <a:rPr lang="en-US" altLang="ko-KR" dirty="0">
+                <a:solidFill>
+                  <a:schemeClr val="tx1">
+                    <a:lumMod val="75000"/>
+                    <a:lumOff val="25000"/>
+                  </a:schemeClr>
+                </a:solidFill>
+              </a:rPr>
+              <a:t>of</a:t>
+            </a:r>
+            <a:r>
+              <a:rPr lang="ko-KR" altLang="en-US" dirty="0">
+                <a:solidFill>
+                  <a:schemeClr val="tx1">
+                    <a:lumMod val="75000"/>
+                    <a:lumOff val="25000"/>
+                  </a:schemeClr>
+                </a:solidFill>
+              </a:rPr>
+              <a:t> </a:t>
+            </a:r>
+            <a:r>
+              <a:rPr lang="en-US" altLang="ko-KR" dirty="0">
+                <a:solidFill>
+                  <a:schemeClr val="tx1">
+                    <a:lumMod val="75000"/>
+                    <a:lumOff val="25000"/>
+                  </a:schemeClr>
+                </a:solidFill>
+              </a:rPr>
+              <a:t>subject on menu tap</a:t>
+            </a:r>
             <a:endParaRPr lang="en-US" dirty="0">
               <a:solidFill>
                 <a:schemeClr val="tx1">
@@ -5171,38 +5452,25 @@
               </a:solidFill>
             </a:endParaRPr>
           </a:p>
-          <a:p>
-            <a:r>
-              <a:rPr lang="en-US" dirty="0">
-                <a:solidFill>
-                  <a:schemeClr val="tx1">
-                    <a:lumMod val="75000"/>
-                    <a:lumOff val="25000"/>
-                  </a:schemeClr>
-                </a:solidFill>
-              </a:rPr>
-              <a:t>Tap the picture to open it</a:t>
-            </a:r>
-          </a:p>
         </p:txBody>
       </p:sp>
     </p:spTree>
     <p:extLst>
       <p:ext uri="{BB962C8B-B14F-4D97-AF65-F5344CB8AC3E}">
-        <p14:creationId xmlns:p14="http://schemas.microsoft.com/office/powerpoint/2010/main" val="1977280061"/>
+        <p14:creationId xmlns:p14="http://schemas.microsoft.com/office/powerpoint/2010/main" val="4230585897"/>
       </p:ext>
     </p:extLst>
   </p:cSld>
   <p:clrMapOvr>
     <a:masterClrMapping/>
   </p:clrMapOvr>
-  <mc:AlternateContent xmlns:mc="http://schemas.openxmlformats.org/markup-compatibility/2006">
-    <mc:Choice xmlns:p159="http://schemas.microsoft.com/office/powerpoint/2015/09/main" Requires="p159">
+  <mc:AlternateContent xmlns:mc="http://schemas.openxmlformats.org/markup-compatibility/2006" xmlns:p159="http://schemas.microsoft.com/office/powerpoint/2015/09/main">
+    <mc:Choice Requires="p159">
       <p:transition spd="med">
         <p159:morph option="byObject"/>
       </p:transition>
     </mc:Choice>
-    <mc:Fallback>
+    <mc:Fallback xmlns="">
       <p:transition spd="med">
         <p:fade/>
       </p:transition>
@@ -5211,7 +5479,7 @@
 </p:sld>
 </file>
 
-<file path=ppt/slides/slide15.xml><?xml version="1.0" encoding="utf-8"?>
+<file path=ppt/slides/slide16.xml><?xml version="1.0" encoding="utf-8"?>
 <p:sld xmlns:a="http://schemas.openxmlformats.org/drawingml/2006/main" xmlns:r="http://schemas.openxmlformats.org/officeDocument/2006/relationships" xmlns:p="http://schemas.openxmlformats.org/presentationml/2006/main">
   <p:cSld>
     <p:spTree>
@@ -5288,7 +5556,7 @@
           <p:cNvPr id="3" name="TextBox 2">
             <a:extLst>
               <a:ext uri="{FF2B5EF4-FFF2-40B4-BE49-F238E27FC236}">
-                <a16:creationId xmlns:a16="http://schemas.microsoft.com/office/drawing/2014/main" id="{FF5DF127-FE3A-4877-8898-D1769B07BED7}"/>
+                <a16:creationId xmlns:a16="http://schemas.microsoft.com/office/drawing/2014/main" id="{2AE10DC9-F8CA-4729-9EDD-1D1AD539051A}"/>
               </a:ext>
             </a:extLst>
           </p:cNvPr>
@@ -5298,7 +5566,7 @@
         <p:spPr>
           <a:xfrm>
             <a:off x="5461000" y="1168400"/>
-            <a:ext cx="5527475" cy="1477328"/>
+            <a:ext cx="3911648" cy="923330"/>
           </a:xfrm>
           <a:prstGeom prst="rect">
             <a:avLst/>
@@ -5320,7 +5588,7 @@
                   </a:schemeClr>
                 </a:solidFill>
               </a:rPr>
-              <a:t>시간표의 </a:t>
+              <a:t>사진을 </a:t>
             </a:r>
             <a:r>
               <a:rPr lang="ko-KR" altLang="en-US" dirty="0" err="1">
@@ -5331,7 +5599,7 @@
                   </a:schemeClr>
                 </a:solidFill>
               </a:rPr>
-              <a:t>메뉴탭에서</a:t>
+              <a:t>탭하여</a:t>
             </a:r>
             <a:r>
               <a:rPr lang="ko-KR" altLang="en-US" dirty="0">
@@ -5342,7 +5610,7 @@
                   </a:schemeClr>
                 </a:solidFill>
               </a:rPr>
-              <a:t> 단축수업을 설정할 수 있습니다</a:t>
+              <a:t> 사진을 볼 수 있습니다</a:t>
             </a:r>
             <a:endParaRPr lang="en-US" altLang="ko-KR" dirty="0">
               <a:solidFill>
@@ -5354,27 +5622,6 @@
             </a:endParaRPr>
           </a:p>
           <a:p>
-            <a:r>
-              <a:rPr lang="ko-KR" altLang="en-US" dirty="0">
-                <a:solidFill>
-                  <a:schemeClr val="tx1">
-                    <a:lumMod val="75000"/>
-                    <a:lumOff val="25000"/>
-                  </a:schemeClr>
-                </a:solidFill>
-              </a:rPr>
-              <a:t>설정된 단축수업 날짜들을 볼 수 있습니다</a:t>
-            </a:r>
-            <a:endParaRPr lang="en-US" altLang="ko-KR" dirty="0">
-              <a:solidFill>
-                <a:schemeClr val="tx1">
-                  <a:lumMod val="75000"/>
-                  <a:lumOff val="25000"/>
-                </a:schemeClr>
-              </a:solidFill>
-            </a:endParaRPr>
-          </a:p>
-          <a:p>
             <a:endParaRPr lang="en-US" dirty="0">
               <a:solidFill>
                 <a:schemeClr val="tx1">
@@ -5394,20 +5641,7 @@
                   </a:schemeClr>
                 </a:solidFill>
               </a:rPr>
-              <a:t>Open set short lesson to set short lesson</a:t>
-            </a:r>
-          </a:p>
-          <a:p>
-            <a:r>
-              <a:rPr lang="en-US" dirty="0">
-                <a:solidFill>
-                  <a:schemeClr val="tx1">
-                    <a:lumMod val="75000"/>
-                    <a:lumOff val="25000"/>
-                  </a:schemeClr>
-                </a:solidFill>
-              </a:rPr>
-              <a:t>Tap show list of set date to see shortened day</a:t>
+              <a:t>Tap the picture to open it</a:t>
             </a:r>
           </a:p>
         </p:txBody>
@@ -5415,20 +5649,20 @@
     </p:spTree>
     <p:extLst>
       <p:ext uri="{BB962C8B-B14F-4D97-AF65-F5344CB8AC3E}">
-        <p14:creationId xmlns:p14="http://schemas.microsoft.com/office/powerpoint/2010/main" val="1153938121"/>
+        <p14:creationId xmlns:p14="http://schemas.microsoft.com/office/powerpoint/2010/main" val="1977280061"/>
       </p:ext>
     </p:extLst>
   </p:cSld>
   <p:clrMapOvr>
     <a:masterClrMapping/>
   </p:clrMapOvr>
-  <mc:AlternateContent xmlns:mc="http://schemas.openxmlformats.org/markup-compatibility/2006">
-    <mc:Choice xmlns:p159="http://schemas.microsoft.com/office/powerpoint/2015/09/main" Requires="p159">
+  <mc:AlternateContent xmlns:mc="http://schemas.openxmlformats.org/markup-compatibility/2006" xmlns:p159="http://schemas.microsoft.com/office/powerpoint/2015/09/main">
+    <mc:Choice Requires="p159">
       <p:transition spd="med">
         <p159:morph option="byObject"/>
       </p:transition>
     </mc:Choice>
-    <mc:Fallback>
+    <mc:Fallback xmlns="">
       <p:transition spd="med">
         <p:fade/>
       </p:transition>
@@ -5437,7 +5671,7 @@
 </p:sld>
 </file>
 
-<file path=ppt/slides/slide16.xml><?xml version="1.0" encoding="utf-8"?>
+<file path=ppt/slides/slide17.xml><?xml version="1.0" encoding="utf-8"?>
 <p:sld xmlns:a="http://schemas.openxmlformats.org/drawingml/2006/main" xmlns:r="http://schemas.openxmlformats.org/officeDocument/2006/relationships" xmlns:p="http://schemas.openxmlformats.org/presentationml/2006/main">
   <p:cSld>
     <p:spTree>
@@ -5514,7 +5748,7 @@
           <p:cNvPr id="3" name="TextBox 2">
             <a:extLst>
               <a:ext uri="{FF2B5EF4-FFF2-40B4-BE49-F238E27FC236}">
-                <a16:creationId xmlns:a16="http://schemas.microsoft.com/office/drawing/2014/main" id="{549F90ED-E9AB-42B6-BA51-16551A4917A7}"/>
+                <a16:creationId xmlns:a16="http://schemas.microsoft.com/office/drawing/2014/main" id="{FF5DF127-FE3A-4877-8898-D1769B07BED7}"/>
               </a:ext>
             </a:extLst>
           </p:cNvPr>
@@ -5524,7 +5758,7 @@
         <p:spPr>
           <a:xfrm>
             <a:off x="5461000" y="1168400"/>
-            <a:ext cx="5349541" cy="1477328"/>
+            <a:ext cx="5527475" cy="1477328"/>
           </a:xfrm>
           <a:prstGeom prst="rect">
             <a:avLst/>
@@ -5546,7 +5780,29 @@
                   </a:schemeClr>
                 </a:solidFill>
               </a:rPr>
-              <a:t>버튼을 클릭하여 날짜를 지정할 수 있습니다</a:t>
+              <a:t>시간표의 </a:t>
+            </a:r>
+            <a:r>
+              <a:rPr lang="ko-KR" altLang="en-US" dirty="0" err="1">
+                <a:solidFill>
+                  <a:schemeClr val="tx1">
+                    <a:lumMod val="75000"/>
+                    <a:lumOff val="25000"/>
+                  </a:schemeClr>
+                </a:solidFill>
+              </a:rPr>
+              <a:t>메뉴탭에서</a:t>
+            </a:r>
+            <a:r>
+              <a:rPr lang="ko-KR" altLang="en-US" dirty="0">
+                <a:solidFill>
+                  <a:schemeClr val="tx1">
+                    <a:lumMod val="75000"/>
+                    <a:lumOff val="25000"/>
+                  </a:schemeClr>
+                </a:solidFill>
+              </a:rPr>
+              <a:t> 단축수업을 설정할 수 있습니다</a:t>
             </a:r>
             <a:endParaRPr lang="en-US" altLang="ko-KR" dirty="0">
               <a:solidFill>
@@ -5567,7 +5823,7 @@
                   </a:schemeClr>
                 </a:solidFill>
               </a:rPr>
-              <a:t>모든 옵션을 알맞게 선택한 후 저장버튼을 누릅니다</a:t>
+              <a:t>설정된 단축수업 날짜들을 볼 수 있습니다</a:t>
             </a:r>
             <a:endParaRPr lang="en-US" altLang="ko-KR" dirty="0">
               <a:solidFill>
@@ -5598,7 +5854,7 @@
                   </a:schemeClr>
                 </a:solidFill>
               </a:rPr>
-              <a:t>Click the button to open date picker</a:t>
+              <a:t>Open set short lesson to set short lesson</a:t>
             </a:r>
           </a:p>
           <a:p>
@@ -5611,7 +5867,7 @@
                   </a:schemeClr>
                 </a:solidFill>
               </a:rPr>
-              <a:t>After set all options properly click save button</a:t>
+              <a:t>Tap show list of set date to see shortened day</a:t>
             </a:r>
           </a:p>
         </p:txBody>
@@ -5619,20 +5875,20 @@
     </p:spTree>
     <p:extLst>
       <p:ext uri="{BB962C8B-B14F-4D97-AF65-F5344CB8AC3E}">
-        <p14:creationId xmlns:p14="http://schemas.microsoft.com/office/powerpoint/2010/main" val="1953693019"/>
+        <p14:creationId xmlns:p14="http://schemas.microsoft.com/office/powerpoint/2010/main" val="1153938121"/>
       </p:ext>
     </p:extLst>
   </p:cSld>
   <p:clrMapOvr>
     <a:masterClrMapping/>
   </p:clrMapOvr>
-  <mc:AlternateContent xmlns:mc="http://schemas.openxmlformats.org/markup-compatibility/2006">
-    <mc:Choice xmlns:p159="http://schemas.microsoft.com/office/powerpoint/2015/09/main" Requires="p159">
+  <mc:AlternateContent xmlns:mc="http://schemas.openxmlformats.org/markup-compatibility/2006" xmlns:p159="http://schemas.microsoft.com/office/powerpoint/2015/09/main">
+    <mc:Choice Requires="p159">
       <p:transition spd="med">
         <p159:morph option="byObject"/>
       </p:transition>
     </mc:Choice>
-    <mc:Fallback>
+    <mc:Fallback xmlns="">
       <p:transition spd="med">
         <p:fade/>
       </p:transition>
@@ -5641,7 +5897,7 @@
 </p:sld>
 </file>
 
-<file path=ppt/slides/slide17.xml><?xml version="1.0" encoding="utf-8"?>
+<file path=ppt/slides/slide18.xml><?xml version="1.0" encoding="utf-8"?>
 <p:sld xmlns:a="http://schemas.openxmlformats.org/drawingml/2006/main" xmlns:r="http://schemas.openxmlformats.org/officeDocument/2006/relationships" xmlns:p="http://schemas.openxmlformats.org/presentationml/2006/main">
   <p:cSld>
     <p:spTree>
@@ -5718,7 +5974,7 @@
           <p:cNvPr id="3" name="TextBox 2">
             <a:extLst>
               <a:ext uri="{FF2B5EF4-FFF2-40B4-BE49-F238E27FC236}">
-                <a16:creationId xmlns:a16="http://schemas.microsoft.com/office/drawing/2014/main" id="{C31DB811-B75D-4316-961E-4198176DB4DE}"/>
+                <a16:creationId xmlns:a16="http://schemas.microsoft.com/office/drawing/2014/main" id="{549F90ED-E9AB-42B6-BA51-16551A4917A7}"/>
               </a:ext>
             </a:extLst>
           </p:cNvPr>
@@ -5728,7 +5984,7 @@
         <p:spPr>
           <a:xfrm>
             <a:off x="5461000" y="1168400"/>
-            <a:ext cx="4373313" cy="923330"/>
+            <a:ext cx="5349541" cy="1477328"/>
           </a:xfrm>
           <a:prstGeom prst="rect">
             <a:avLst/>
@@ -5742,17 +5998,6 @@
           <a:lstStyle/>
           <a:p>
             <a:r>
-              <a:rPr lang="ko-KR" altLang="en-US" dirty="0" err="1">
-                <a:solidFill>
-                  <a:schemeClr val="tx1">
-                    <a:lumMod val="75000"/>
-                    <a:lumOff val="25000"/>
-                  </a:schemeClr>
-                </a:solidFill>
-              </a:rPr>
-              <a:t>탭하여</a:t>
-            </a:r>
-            <a:r>
               <a:rPr lang="ko-KR" altLang="en-US" dirty="0">
                 <a:solidFill>
                   <a:schemeClr val="tx1">
@@ -5761,7 +6006,7 @@
                   </a:schemeClr>
                 </a:solidFill>
               </a:rPr>
-              <a:t> 설정된 날짜를 제거할 수 있습니다</a:t>
+              <a:t>버튼을 클릭하여 날짜를 지정할 수 있습니다</a:t>
             </a:r>
             <a:endParaRPr lang="en-US" altLang="ko-KR" dirty="0">
               <a:solidFill>
@@ -5773,6 +6018,27 @@
             </a:endParaRPr>
           </a:p>
           <a:p>
+            <a:r>
+              <a:rPr lang="ko-KR" altLang="en-US" dirty="0">
+                <a:solidFill>
+                  <a:schemeClr val="tx1">
+                    <a:lumMod val="75000"/>
+                    <a:lumOff val="25000"/>
+                  </a:schemeClr>
+                </a:solidFill>
+              </a:rPr>
+              <a:t>모든 옵션을 알맞게 선택한 후 저장버튼을 누릅니다</a:t>
+            </a:r>
+            <a:endParaRPr lang="en-US" altLang="ko-KR" dirty="0">
+              <a:solidFill>
+                <a:schemeClr val="tx1">
+                  <a:lumMod val="75000"/>
+                  <a:lumOff val="25000"/>
+                </a:schemeClr>
+              </a:solidFill>
+            </a:endParaRPr>
+          </a:p>
+          <a:p>
             <a:endParaRPr lang="en-US" dirty="0">
               <a:solidFill>
                 <a:schemeClr val="tx1">
@@ -5792,7 +6058,20 @@
                   </a:schemeClr>
                 </a:solidFill>
               </a:rPr>
-              <a:t>Tap item to remove</a:t>
+              <a:t>Click the button to open date picker</a:t>
+            </a:r>
+          </a:p>
+          <a:p>
+            <a:r>
+              <a:rPr lang="en-US" dirty="0">
+                <a:solidFill>
+                  <a:schemeClr val="tx1">
+                    <a:lumMod val="75000"/>
+                    <a:lumOff val="25000"/>
+                  </a:schemeClr>
+                </a:solidFill>
+              </a:rPr>
+              <a:t>After set all options properly click save button</a:t>
             </a:r>
           </a:p>
         </p:txBody>
@@ -5800,20 +6079,20 @@
     </p:spTree>
     <p:extLst>
       <p:ext uri="{BB962C8B-B14F-4D97-AF65-F5344CB8AC3E}">
-        <p14:creationId xmlns:p14="http://schemas.microsoft.com/office/powerpoint/2010/main" val="364405599"/>
+        <p14:creationId xmlns:p14="http://schemas.microsoft.com/office/powerpoint/2010/main" val="1953693019"/>
       </p:ext>
     </p:extLst>
   </p:cSld>
   <p:clrMapOvr>
     <a:masterClrMapping/>
   </p:clrMapOvr>
-  <mc:AlternateContent xmlns:mc="http://schemas.openxmlformats.org/markup-compatibility/2006">
-    <mc:Choice xmlns:p159="http://schemas.microsoft.com/office/powerpoint/2015/09/main" Requires="p159">
+  <mc:AlternateContent xmlns:mc="http://schemas.openxmlformats.org/markup-compatibility/2006" xmlns:p159="http://schemas.microsoft.com/office/powerpoint/2015/09/main">
+    <mc:Choice Requires="p159">
       <p:transition spd="med">
         <p159:morph option="byObject"/>
       </p:transition>
     </mc:Choice>
-    <mc:Fallback>
+    <mc:Fallback xmlns="">
       <p:transition spd="med">
         <p:fade/>
       </p:transition>
@@ -5822,7 +6101,7 @@
 </p:sld>
 </file>
 
-<file path=ppt/slides/slide18.xml><?xml version="1.0" encoding="utf-8"?>
+<file path=ppt/slides/slide19.xml><?xml version="1.0" encoding="utf-8"?>
 <p:sld xmlns:a="http://schemas.openxmlformats.org/drawingml/2006/main" xmlns:r="http://schemas.openxmlformats.org/officeDocument/2006/relationships" xmlns:p="http://schemas.openxmlformats.org/presentationml/2006/main">
   <p:cSld>
     <p:spTree>
@@ -5896,10 +6175,10 @@
       </p:sp>
       <p:sp>
         <p:nvSpPr>
-          <p:cNvPr id="4" name="TextBox 3">
-            <a:extLst>
-              <a:ext uri="{FF2B5EF4-FFF2-40B4-BE49-F238E27FC236}">
-                <a16:creationId xmlns:a16="http://schemas.microsoft.com/office/drawing/2014/main" id="{F9395928-8690-487B-9A18-A4CA68869A57}"/>
+          <p:cNvPr id="3" name="TextBox 2">
+            <a:extLst>
+              <a:ext uri="{FF2B5EF4-FFF2-40B4-BE49-F238E27FC236}">
+                <a16:creationId xmlns:a16="http://schemas.microsoft.com/office/drawing/2014/main" id="{C31DB811-B75D-4316-961E-4198176DB4DE}"/>
               </a:ext>
             </a:extLst>
           </p:cNvPr>
@@ -5923,6 +6202,17 @@
           <a:lstStyle/>
           <a:p>
             <a:r>
+              <a:rPr lang="ko-KR" altLang="en-US" dirty="0" err="1">
+                <a:solidFill>
+                  <a:schemeClr val="tx1">
+                    <a:lumMod val="75000"/>
+                    <a:lumOff val="25000"/>
+                  </a:schemeClr>
+                </a:solidFill>
+              </a:rPr>
+              <a:t>탭하여</a:t>
+            </a:r>
+            <a:r>
               <a:rPr lang="ko-KR" altLang="en-US" dirty="0">
                 <a:solidFill>
                   <a:schemeClr val="tx1">
@@ -5931,7 +6221,7 @@
                   </a:schemeClr>
                 </a:solidFill>
               </a:rPr>
-              <a:t>더 많은 사진을 저장하고 효율적으로 공부</a:t>
+              <a:t> 설정된 날짜를 제거할 수 있습니다</a:t>
             </a:r>
             <a:endParaRPr lang="en-US" altLang="ko-KR" dirty="0">
               <a:solidFill>
@@ -5962,216 +6252,7 @@
                   </a:schemeClr>
                 </a:solidFill>
               </a:rPr>
-              <a:t>Save</a:t>
-            </a:r>
-            <a:r>
-              <a:rPr lang="ko-KR" altLang="en-US" dirty="0">
-                <a:solidFill>
-                  <a:schemeClr val="tx1">
-                    <a:lumMod val="75000"/>
-                    <a:lumOff val="25000"/>
-                  </a:schemeClr>
-                </a:solidFill>
-              </a:rPr>
-              <a:t> </a:t>
-            </a:r>
-            <a:r>
-              <a:rPr lang="en-US" altLang="ko-KR" dirty="0">
-                <a:solidFill>
-                  <a:schemeClr val="tx1">
-                    <a:lumMod val="75000"/>
-                    <a:lumOff val="25000"/>
-                  </a:schemeClr>
-                </a:solidFill>
-              </a:rPr>
-              <a:t>more</a:t>
-            </a:r>
-            <a:r>
-              <a:rPr lang="ko-KR" altLang="en-US" dirty="0">
-                <a:solidFill>
-                  <a:schemeClr val="tx1">
-                    <a:lumMod val="75000"/>
-                    <a:lumOff val="25000"/>
-                  </a:schemeClr>
-                </a:solidFill>
-              </a:rPr>
-              <a:t> </a:t>
-            </a:r>
-            <a:r>
-              <a:rPr lang="en-US" altLang="ko-KR" dirty="0">
-                <a:solidFill>
-                  <a:schemeClr val="tx1">
-                    <a:lumMod val="75000"/>
-                    <a:lumOff val="25000"/>
-                  </a:schemeClr>
-                </a:solidFill>
-              </a:rPr>
-              <a:t>picture</a:t>
-            </a:r>
-            <a:r>
-              <a:rPr lang="ko-KR" altLang="en-US" dirty="0">
-                <a:solidFill>
-                  <a:schemeClr val="tx1">
-                    <a:lumMod val="75000"/>
-                    <a:lumOff val="25000"/>
-                  </a:schemeClr>
-                </a:solidFill>
-              </a:rPr>
-              <a:t> </a:t>
-            </a:r>
-            <a:r>
-              <a:rPr lang="en-US" altLang="ko-KR" dirty="0">
-                <a:solidFill>
-                  <a:schemeClr val="tx1">
-                    <a:lumMod val="75000"/>
-                    <a:lumOff val="25000"/>
-                  </a:schemeClr>
-                </a:solidFill>
-              </a:rPr>
-              <a:t>save</a:t>
-            </a:r>
-            <a:r>
-              <a:rPr lang="ko-KR" altLang="en-US" dirty="0">
-                <a:solidFill>
-                  <a:schemeClr val="tx1">
-                    <a:lumMod val="75000"/>
-                    <a:lumOff val="25000"/>
-                  </a:schemeClr>
-                </a:solidFill>
-              </a:rPr>
-              <a:t> </a:t>
-            </a:r>
-            <a:r>
-              <a:rPr lang="en-US" altLang="ko-KR" dirty="0">
-                <a:solidFill>
-                  <a:schemeClr val="tx1">
-                    <a:lumMod val="75000"/>
-                    <a:lumOff val="25000"/>
-                  </a:schemeClr>
-                </a:solidFill>
-              </a:rPr>
-              <a:t>more</a:t>
-            </a:r>
-            <a:r>
-              <a:rPr lang="ko-KR" altLang="en-US" dirty="0">
-                <a:solidFill>
-                  <a:schemeClr val="tx1">
-                    <a:lumMod val="75000"/>
-                    <a:lumOff val="25000"/>
-                  </a:schemeClr>
-                </a:solidFill>
-              </a:rPr>
-              <a:t> </a:t>
-            </a:r>
-            <a:r>
-              <a:rPr lang="en-US" altLang="ko-KR" dirty="0">
-                <a:solidFill>
-                  <a:schemeClr val="tx1">
-                    <a:lumMod val="75000"/>
-                    <a:lumOff val="25000"/>
-                  </a:schemeClr>
-                </a:solidFill>
-              </a:rPr>
-              <a:t>knowledge</a:t>
-            </a:r>
-            <a:endParaRPr lang="en-US" dirty="0">
-              <a:solidFill>
-                <a:schemeClr val="tx1">
-                  <a:lumMod val="75000"/>
-                  <a:lumOff val="25000"/>
-                </a:schemeClr>
-              </a:solidFill>
-            </a:endParaRPr>
-          </a:p>
-        </p:txBody>
-      </p:sp>
-      <p:pic>
-        <p:nvPicPr>
-          <p:cNvPr id="5" name="그림 4" descr="개체이(가) 표시된 사진&#10;&#10;높은 신뢰도로 생성된 설명">
-            <a:extLst>
-              <a:ext uri="{FF2B5EF4-FFF2-40B4-BE49-F238E27FC236}">
-                <a16:creationId xmlns:a16="http://schemas.microsoft.com/office/drawing/2014/main" id="{7917688F-928C-4B78-B202-BAB542A2517B}"/>
-              </a:ext>
-            </a:extLst>
-          </p:cNvPr>
-          <p:cNvPicPr>
-            <a:picLocks noChangeAspect="1"/>
-          </p:cNvPicPr>
-          <p:nvPr/>
-        </p:nvPicPr>
-        <p:blipFill>
-          <a:blip r:embed="rId3">
-            <a:extLst>
-              <a:ext uri="{28A0092B-C50C-407E-A947-70E740481C1C}">
-                <a14:useLocalDpi xmlns:a14="http://schemas.microsoft.com/office/drawing/2010/main" val="0"/>
-              </a:ext>
-            </a:extLst>
-          </a:blip>
-          <a:stretch>
-            <a:fillRect/>
-          </a:stretch>
-        </p:blipFill>
-        <p:spPr>
-          <a:xfrm>
-            <a:off x="9981902" y="6113605"/>
-            <a:ext cx="651469" cy="651469"/>
-          </a:xfrm>
-          <a:prstGeom prst="rect">
-            <a:avLst/>
-          </a:prstGeom>
-        </p:spPr>
-      </p:pic>
-      <p:sp>
-        <p:nvSpPr>
-          <p:cNvPr id="7" name="TextBox 6">
-            <a:extLst>
-              <a:ext uri="{FF2B5EF4-FFF2-40B4-BE49-F238E27FC236}">
-                <a16:creationId xmlns:a16="http://schemas.microsoft.com/office/drawing/2014/main" id="{4C4F9E78-7989-4CBF-8C38-5CDD1A50F72D}"/>
-              </a:ext>
-            </a:extLst>
-          </p:cNvPr>
-          <p:cNvSpPr txBox="1"/>
-          <p:nvPr/>
-        </p:nvSpPr>
-        <p:spPr>
-          <a:xfrm>
-            <a:off x="10586304" y="6169609"/>
-            <a:ext cx="1605696" cy="553998"/>
-          </a:xfrm>
-          <a:prstGeom prst="rect">
-            <a:avLst/>
-          </a:prstGeom>
-          <a:noFill/>
-        </p:spPr>
-        <p:txBody>
-          <a:bodyPr wrap="none" rtlCol="0">
-            <a:spAutoFit/>
-          </a:bodyPr>
-          <a:lstStyle/>
-          <a:p>
-            <a:r>
-              <a:rPr lang="en-US" dirty="0">
-                <a:solidFill>
-                  <a:schemeClr val="tx1">
-                    <a:lumMod val="50000"/>
-                    <a:lumOff val="50000"/>
-                  </a:schemeClr>
-                </a:solidFill>
-              </a:rPr>
-              <a:t>School Capture</a:t>
-            </a:r>
-          </a:p>
-          <a:p>
-            <a:r>
-              <a:rPr lang="en-US" sz="1200" dirty="0">
-                <a:solidFill>
-                  <a:schemeClr val="tx1">
-                    <a:lumMod val="50000"/>
-                    <a:lumOff val="50000"/>
-                  </a:schemeClr>
-                </a:solidFill>
-              </a:rPr>
-              <a:t>30613 / 30620</a:t>
+              <a:t>Tap item to remove</a:t>
             </a:r>
           </a:p>
         </p:txBody>
@@ -6179,20 +6260,20 @@
     </p:spTree>
     <p:extLst>
       <p:ext uri="{BB962C8B-B14F-4D97-AF65-F5344CB8AC3E}">
-        <p14:creationId xmlns:p14="http://schemas.microsoft.com/office/powerpoint/2010/main" val="491048724"/>
+        <p14:creationId xmlns:p14="http://schemas.microsoft.com/office/powerpoint/2010/main" val="364405599"/>
       </p:ext>
     </p:extLst>
   </p:cSld>
   <p:clrMapOvr>
     <a:masterClrMapping/>
   </p:clrMapOvr>
-  <mc:AlternateContent xmlns:mc="http://schemas.openxmlformats.org/markup-compatibility/2006">
-    <mc:Choice xmlns:p159="http://schemas.microsoft.com/office/powerpoint/2015/09/main" Requires="p159">
+  <mc:AlternateContent xmlns:mc="http://schemas.openxmlformats.org/markup-compatibility/2006" xmlns:p159="http://schemas.microsoft.com/office/powerpoint/2015/09/main">
+    <mc:Choice Requires="p159">
       <p:transition spd="med">
         <p159:morph option="byObject"/>
       </p:transition>
     </mc:Choice>
-    <mc:Fallback>
+    <mc:Fallback xmlns="">
       <p:transition spd="med">
         <p:fade/>
       </p:transition>
@@ -6367,13 +6448,13 @@
   <p:clrMapOvr>
     <a:masterClrMapping/>
   </p:clrMapOvr>
-  <mc:AlternateContent xmlns:mc="http://schemas.openxmlformats.org/markup-compatibility/2006">
-    <mc:Choice xmlns:p159="http://schemas.microsoft.com/office/powerpoint/2015/09/main" Requires="p159">
+  <mc:AlternateContent xmlns:mc="http://schemas.openxmlformats.org/markup-compatibility/2006" xmlns:p159="http://schemas.microsoft.com/office/powerpoint/2015/09/main">
+    <mc:Choice Requires="p159">
       <p:transition spd="slow">
         <p159:morph option="byObject"/>
       </p:transition>
     </mc:Choice>
-    <mc:Fallback>
+    <mc:Fallback xmlns="">
       <p:transition spd="slow">
         <p:fade/>
       </p:transition>
@@ -6382,7 +6463,7 @@
 </p:sld>
 </file>
 
-<file path=ppt/slides/slide3.xml><?xml version="1.0" encoding="utf-8"?>
+<file path=ppt/slides/slide20.xml><?xml version="1.0" encoding="utf-8"?>
 <p:sld xmlns:a="http://schemas.openxmlformats.org/drawingml/2006/main" xmlns:r="http://schemas.openxmlformats.org/officeDocument/2006/relationships" xmlns:p="http://schemas.openxmlformats.org/presentationml/2006/main">
   <p:cSld>
     <p:spTree>
@@ -6459,7 +6540,7 @@
           <p:cNvPr id="4" name="TextBox 3">
             <a:extLst>
               <a:ext uri="{FF2B5EF4-FFF2-40B4-BE49-F238E27FC236}">
-                <a16:creationId xmlns:a16="http://schemas.microsoft.com/office/drawing/2014/main" id="{95CC0DBF-EA51-49AD-84C3-8C60576402FE}"/>
+                <a16:creationId xmlns:a16="http://schemas.microsoft.com/office/drawing/2014/main" id="{F9395928-8690-487B-9A18-A4CA68869A57}"/>
               </a:ext>
             </a:extLst>
           </p:cNvPr>
@@ -6469,7 +6550,389 @@
         <p:spPr>
           <a:xfrm>
             <a:off x="5461000" y="1168400"/>
-            <a:ext cx="5873467" cy="2031325"/>
+            <a:ext cx="4039888" cy="923330"/>
+          </a:xfrm>
+          <a:prstGeom prst="rect">
+            <a:avLst/>
+          </a:prstGeom>
+          <a:noFill/>
+        </p:spPr>
+        <p:txBody>
+          <a:bodyPr wrap="none" rtlCol="0">
+            <a:spAutoFit/>
+          </a:bodyPr>
+          <a:lstStyle/>
+          <a:p>
+            <a:r>
+              <a:rPr lang="ko-KR" altLang="en-US" dirty="0">
+                <a:solidFill>
+                  <a:schemeClr val="tx1">
+                    <a:lumMod val="75000"/>
+                    <a:lumOff val="25000"/>
+                  </a:schemeClr>
+                </a:solidFill>
+              </a:rPr>
+              <a:t>더 많은 사진을 저장하고 더 많이 공부</a:t>
+            </a:r>
+            <a:r>
+              <a:rPr lang="en-US" altLang="ko-KR" dirty="0">
+                <a:solidFill>
+                  <a:schemeClr val="tx1">
+                    <a:lumMod val="75000"/>
+                    <a:lumOff val="25000"/>
+                  </a:schemeClr>
+                </a:solidFill>
+              </a:rPr>
+              <a:t>!</a:t>
+            </a:r>
+          </a:p>
+          <a:p>
+            <a:endParaRPr lang="en-US" dirty="0">
+              <a:solidFill>
+                <a:schemeClr val="tx1">
+                  <a:lumMod val="75000"/>
+                  <a:lumOff val="25000"/>
+                </a:schemeClr>
+              </a:solidFill>
+            </a:endParaRPr>
+          </a:p>
+          <a:p>
+            <a:r>
+              <a:rPr lang="en-US" dirty="0">
+                <a:solidFill>
+                  <a:schemeClr val="tx1">
+                    <a:lumMod val="75000"/>
+                    <a:lumOff val="25000"/>
+                  </a:schemeClr>
+                </a:solidFill>
+              </a:rPr>
+              <a:t>Save</a:t>
+            </a:r>
+            <a:r>
+              <a:rPr lang="ko-KR" altLang="en-US" dirty="0">
+                <a:solidFill>
+                  <a:schemeClr val="tx1">
+                    <a:lumMod val="75000"/>
+                    <a:lumOff val="25000"/>
+                  </a:schemeClr>
+                </a:solidFill>
+              </a:rPr>
+              <a:t> </a:t>
+            </a:r>
+            <a:r>
+              <a:rPr lang="en-US" altLang="ko-KR" dirty="0">
+                <a:solidFill>
+                  <a:schemeClr val="tx1">
+                    <a:lumMod val="75000"/>
+                    <a:lumOff val="25000"/>
+                  </a:schemeClr>
+                </a:solidFill>
+              </a:rPr>
+              <a:t>more</a:t>
+            </a:r>
+            <a:r>
+              <a:rPr lang="ko-KR" altLang="en-US" dirty="0">
+                <a:solidFill>
+                  <a:schemeClr val="tx1">
+                    <a:lumMod val="75000"/>
+                    <a:lumOff val="25000"/>
+                  </a:schemeClr>
+                </a:solidFill>
+              </a:rPr>
+              <a:t> </a:t>
+            </a:r>
+            <a:r>
+              <a:rPr lang="en-US" altLang="ko-KR" dirty="0">
+                <a:solidFill>
+                  <a:schemeClr val="tx1">
+                    <a:lumMod val="75000"/>
+                    <a:lumOff val="25000"/>
+                  </a:schemeClr>
+                </a:solidFill>
+              </a:rPr>
+              <a:t>picture</a:t>
+            </a:r>
+            <a:r>
+              <a:rPr lang="ko-KR" altLang="en-US" dirty="0">
+                <a:solidFill>
+                  <a:schemeClr val="tx1">
+                    <a:lumMod val="75000"/>
+                    <a:lumOff val="25000"/>
+                  </a:schemeClr>
+                </a:solidFill>
+              </a:rPr>
+              <a:t> </a:t>
+            </a:r>
+            <a:r>
+              <a:rPr lang="en-US" altLang="ko-KR" dirty="0">
+                <a:solidFill>
+                  <a:schemeClr val="tx1">
+                    <a:lumMod val="75000"/>
+                    <a:lumOff val="25000"/>
+                  </a:schemeClr>
+                </a:solidFill>
+              </a:rPr>
+              <a:t>save</a:t>
+            </a:r>
+            <a:r>
+              <a:rPr lang="ko-KR" altLang="en-US" dirty="0">
+                <a:solidFill>
+                  <a:schemeClr val="tx1">
+                    <a:lumMod val="75000"/>
+                    <a:lumOff val="25000"/>
+                  </a:schemeClr>
+                </a:solidFill>
+              </a:rPr>
+              <a:t> </a:t>
+            </a:r>
+            <a:r>
+              <a:rPr lang="en-US" altLang="ko-KR" dirty="0">
+                <a:solidFill>
+                  <a:schemeClr val="tx1">
+                    <a:lumMod val="75000"/>
+                    <a:lumOff val="25000"/>
+                  </a:schemeClr>
+                </a:solidFill>
+              </a:rPr>
+              <a:t>more</a:t>
+            </a:r>
+            <a:r>
+              <a:rPr lang="ko-KR" altLang="en-US" dirty="0">
+                <a:solidFill>
+                  <a:schemeClr val="tx1">
+                    <a:lumMod val="75000"/>
+                    <a:lumOff val="25000"/>
+                  </a:schemeClr>
+                </a:solidFill>
+              </a:rPr>
+              <a:t> </a:t>
+            </a:r>
+            <a:r>
+              <a:rPr lang="en-US" altLang="ko-KR" dirty="0">
+                <a:solidFill>
+                  <a:schemeClr val="tx1">
+                    <a:lumMod val="75000"/>
+                    <a:lumOff val="25000"/>
+                  </a:schemeClr>
+                </a:solidFill>
+              </a:rPr>
+              <a:t>knowledge</a:t>
+            </a:r>
+            <a:endParaRPr lang="en-US" dirty="0">
+              <a:solidFill>
+                <a:schemeClr val="tx1">
+                  <a:lumMod val="75000"/>
+                  <a:lumOff val="25000"/>
+                </a:schemeClr>
+              </a:solidFill>
+            </a:endParaRPr>
+          </a:p>
+        </p:txBody>
+      </p:sp>
+      <p:pic>
+        <p:nvPicPr>
+          <p:cNvPr id="5" name="그림 4" descr="개체이(가) 표시된 사진&#10;&#10;높은 신뢰도로 생성된 설명">
+            <a:extLst>
+              <a:ext uri="{FF2B5EF4-FFF2-40B4-BE49-F238E27FC236}">
+                <a16:creationId xmlns:a16="http://schemas.microsoft.com/office/drawing/2014/main" id="{7917688F-928C-4B78-B202-BAB542A2517B}"/>
+              </a:ext>
+            </a:extLst>
+          </p:cNvPr>
+          <p:cNvPicPr>
+            <a:picLocks noChangeAspect="1"/>
+          </p:cNvPicPr>
+          <p:nvPr/>
+        </p:nvPicPr>
+        <p:blipFill>
+          <a:blip r:embed="rId3">
+            <a:extLst>
+              <a:ext uri="{28A0092B-C50C-407E-A947-70E740481C1C}">
+                <a14:useLocalDpi xmlns:a14="http://schemas.microsoft.com/office/drawing/2010/main" val="0"/>
+              </a:ext>
+            </a:extLst>
+          </a:blip>
+          <a:stretch>
+            <a:fillRect/>
+          </a:stretch>
+        </p:blipFill>
+        <p:spPr>
+          <a:xfrm>
+            <a:off x="9981902" y="6113605"/>
+            <a:ext cx="651469" cy="651469"/>
+          </a:xfrm>
+          <a:prstGeom prst="rect">
+            <a:avLst/>
+          </a:prstGeom>
+        </p:spPr>
+      </p:pic>
+      <p:sp>
+        <p:nvSpPr>
+          <p:cNvPr id="7" name="TextBox 6">
+            <a:extLst>
+              <a:ext uri="{FF2B5EF4-FFF2-40B4-BE49-F238E27FC236}">
+                <a16:creationId xmlns:a16="http://schemas.microsoft.com/office/drawing/2014/main" id="{4C4F9E78-7989-4CBF-8C38-5CDD1A50F72D}"/>
+              </a:ext>
+            </a:extLst>
+          </p:cNvPr>
+          <p:cNvSpPr txBox="1"/>
+          <p:nvPr/>
+        </p:nvSpPr>
+        <p:spPr>
+          <a:xfrm>
+            <a:off x="10586304" y="6169609"/>
+            <a:ext cx="1605696" cy="553998"/>
+          </a:xfrm>
+          <a:prstGeom prst="rect">
+            <a:avLst/>
+          </a:prstGeom>
+          <a:noFill/>
+        </p:spPr>
+        <p:txBody>
+          <a:bodyPr wrap="none" rtlCol="0">
+            <a:spAutoFit/>
+          </a:bodyPr>
+          <a:lstStyle/>
+          <a:p>
+            <a:r>
+              <a:rPr lang="en-US" dirty="0">
+                <a:solidFill>
+                  <a:schemeClr val="tx1">
+                    <a:lumMod val="50000"/>
+                    <a:lumOff val="50000"/>
+                  </a:schemeClr>
+                </a:solidFill>
+              </a:rPr>
+              <a:t>School Capture</a:t>
+            </a:r>
+          </a:p>
+          <a:p>
+            <a:r>
+              <a:rPr lang="en-US" sz="1200" dirty="0">
+                <a:solidFill>
+                  <a:schemeClr val="tx1">
+                    <a:lumMod val="50000"/>
+                    <a:lumOff val="50000"/>
+                  </a:schemeClr>
+                </a:solidFill>
+              </a:rPr>
+              <a:t>30613 / 30620</a:t>
+            </a:r>
+          </a:p>
+        </p:txBody>
+      </p:sp>
+    </p:spTree>
+    <p:extLst>
+      <p:ext uri="{BB962C8B-B14F-4D97-AF65-F5344CB8AC3E}">
+        <p14:creationId xmlns:p14="http://schemas.microsoft.com/office/powerpoint/2010/main" val="491048724"/>
+      </p:ext>
+    </p:extLst>
+  </p:cSld>
+  <p:clrMapOvr>
+    <a:masterClrMapping/>
+  </p:clrMapOvr>
+  <mc:AlternateContent xmlns:mc="http://schemas.openxmlformats.org/markup-compatibility/2006" xmlns:p159="http://schemas.microsoft.com/office/powerpoint/2015/09/main">
+    <mc:Choice Requires="p159">
+      <p:transition spd="med">
+        <p159:morph option="byObject"/>
+      </p:transition>
+    </mc:Choice>
+    <mc:Fallback xmlns="">
+      <p:transition spd="med">
+        <p:fade/>
+      </p:transition>
+    </mc:Fallback>
+  </mc:AlternateContent>
+</p:sld>
+</file>
+
+<file path=ppt/slides/slide3.xml><?xml version="1.0" encoding="utf-8"?>
+<p:sld xmlns:a="http://schemas.openxmlformats.org/drawingml/2006/main" xmlns:r="http://schemas.openxmlformats.org/officeDocument/2006/relationships" xmlns:p="http://schemas.openxmlformats.org/presentationml/2006/main">
+  <p:cSld>
+    <p:spTree>
+      <p:nvGrpSpPr>
+        <p:cNvPr id="1" name=""/>
+        <p:cNvGrpSpPr/>
+        <p:nvPr/>
+      </p:nvGrpSpPr>
+      <p:grpSpPr>
+        <a:xfrm>
+          <a:off x="0" y="0"/>
+          <a:ext cx="0" cy="0"/>
+          <a:chOff x="0" y="0"/>
+          <a:chExt cx="0" cy="0"/>
+        </a:xfrm>
+      </p:grpSpPr>
+      <p:sp>
+        <p:nvSpPr>
+          <p:cNvPr id="6" name="직사각형 5">
+            <a:extLst>
+              <a:ext uri="{FF2B5EF4-FFF2-40B4-BE49-F238E27FC236}">
+                <a16:creationId xmlns:a16="http://schemas.microsoft.com/office/drawing/2014/main" id="{36F5D3F7-76FC-4B6A-A76A-CE1681F12470}"/>
+              </a:ext>
+            </a:extLst>
+          </p:cNvPr>
+          <p:cNvSpPr/>
+          <p:nvPr/>
+        </p:nvSpPr>
+        <p:spPr>
+          <a:xfrm>
+            <a:off x="981075" y="0"/>
+            <a:ext cx="3848100" cy="6858000"/>
+          </a:xfrm>
+          <a:prstGeom prst="rect">
+            <a:avLst/>
+          </a:prstGeom>
+          <a:blipFill>
+            <a:blip r:embed="rId2"/>
+            <a:stretch>
+              <a:fillRect/>
+            </a:stretch>
+          </a:blipFill>
+          <a:ln>
+            <a:noFill/>
+          </a:ln>
+        </p:spPr>
+        <p:style>
+          <a:lnRef idx="2">
+            <a:schemeClr val="accent1">
+              <a:shade val="50000"/>
+            </a:schemeClr>
+          </a:lnRef>
+          <a:fillRef idx="1">
+            <a:schemeClr val="accent1"/>
+          </a:fillRef>
+          <a:effectRef idx="0">
+            <a:schemeClr val="accent1"/>
+          </a:effectRef>
+          <a:fontRef idx="minor">
+            <a:schemeClr val="lt1"/>
+          </a:fontRef>
+        </p:style>
+        <p:txBody>
+          <a:bodyPr rtlCol="0" anchor="ctr"/>
+          <a:lstStyle/>
+          <a:p>
+            <a:pPr algn="ctr"/>
+            <a:endParaRPr lang="en-US"/>
+          </a:p>
+        </p:txBody>
+      </p:sp>
+      <p:sp>
+        <p:nvSpPr>
+          <p:cNvPr id="4" name="TextBox 3">
+            <a:extLst>
+              <a:ext uri="{FF2B5EF4-FFF2-40B4-BE49-F238E27FC236}">
+                <a16:creationId xmlns:a16="http://schemas.microsoft.com/office/drawing/2014/main" id="{95CC0DBF-EA51-49AD-84C3-8C60576402FE}"/>
+              </a:ext>
+            </a:extLst>
+          </p:cNvPr>
+          <p:cNvSpPr txBox="1"/>
+          <p:nvPr/>
+        </p:nvSpPr>
+        <p:spPr>
+          <a:xfrm>
+            <a:off x="5461000" y="1168400"/>
+            <a:ext cx="5296643" cy="2031325"/>
           </a:xfrm>
           <a:prstGeom prst="rect">
             <a:avLst/>
@@ -6643,7 +7106,7 @@
                   </a:schemeClr>
                 </a:solidFill>
               </a:rPr>
-              <a:t>Donate information and Timetable setting is in menu</a:t>
+              <a:t>Donation and Timetable setting is in menu tap</a:t>
             </a:r>
           </a:p>
           <a:p>
@@ -6656,7 +7119,18 @@
                   </a:schemeClr>
                 </a:solidFill>
               </a:rPr>
-              <a:t>You</a:t>
+              <a:t>A</a:t>
+            </a:r>
+            <a:r>
+              <a:rPr lang="en-US" altLang="ko-KR" dirty="0">
+                <a:solidFill>
+                  <a:schemeClr val="tx1">
+                    <a:lumMod val="75000"/>
+                    <a:lumOff val="25000"/>
+                  </a:schemeClr>
+                </a:solidFill>
+              </a:rPr>
+              <a:t>dd</a:t>
             </a:r>
             <a:r>
               <a:rPr lang="ko-KR" altLang="en-US" dirty="0">
@@ -6678,7 +7152,7 @@
                   </a:schemeClr>
                 </a:solidFill>
               </a:rPr>
-              <a:t>can</a:t>
+              <a:t>subjects</a:t>
             </a:r>
             <a:r>
               <a:rPr lang="ko-KR" altLang="en-US" dirty="0">
@@ -6700,51 +7174,7 @@
                   </a:schemeClr>
                 </a:solidFill>
               </a:rPr>
-              <a:t>add</a:t>
-            </a:r>
-            <a:r>
-              <a:rPr lang="ko-KR" altLang="en-US" dirty="0">
-                <a:solidFill>
-                  <a:schemeClr val="tx1">
-                    <a:lumMod val="75000"/>
-                    <a:lumOff val="25000"/>
-                  </a:schemeClr>
-                </a:solidFill>
-              </a:rPr>
-              <a:t> </a:t>
-            </a:r>
-            <a:r>
-              <a:rPr lang="en-US" altLang="ko-KR" dirty="0">
-                <a:solidFill>
-                  <a:schemeClr val="tx1">
-                    <a:lumMod val="75000"/>
-                    <a:lumOff val="25000"/>
-                  </a:schemeClr>
-                </a:solidFill>
-              </a:rPr>
-              <a:t>subjects</a:t>
-            </a:r>
-            <a:r>
-              <a:rPr lang="ko-KR" altLang="en-US" dirty="0">
-                <a:solidFill>
-                  <a:schemeClr val="tx1">
-                    <a:lumMod val="75000"/>
-                    <a:lumOff val="25000"/>
-                  </a:schemeClr>
-                </a:solidFill>
-              </a:rPr>
-              <a:t> </a:t>
-            </a:r>
-            <a:r>
-              <a:rPr lang="en-US" altLang="ko-KR" dirty="0">
-                <a:solidFill>
-                  <a:schemeClr val="tx1">
-                    <a:lumMod val="75000"/>
-                    <a:lumOff val="25000"/>
-                  </a:schemeClr>
-                </a:solidFill>
-              </a:rPr>
-              <a:t>and</a:t>
+              <a:t>or</a:t>
             </a:r>
             <a:r>
               <a:rPr lang="ko-KR" altLang="en-US" dirty="0">
@@ -6789,13 +7219,13 @@
   <p:clrMapOvr>
     <a:masterClrMapping/>
   </p:clrMapOvr>
-  <mc:AlternateContent xmlns:mc="http://schemas.openxmlformats.org/markup-compatibility/2006">
-    <mc:Choice xmlns:p159="http://schemas.microsoft.com/office/powerpoint/2015/09/main" Requires="p159">
+  <mc:AlternateContent xmlns:mc="http://schemas.openxmlformats.org/markup-compatibility/2006" xmlns:p159="http://schemas.microsoft.com/office/powerpoint/2015/09/main">
+    <mc:Choice Requires="p159">
       <p:transition spd="slow">
         <p159:morph option="byObject"/>
       </p:transition>
     </mc:Choice>
-    <mc:Fallback>
+    <mc:Fallback xmlns="">
       <p:transition spd="slow">
         <p:fade/>
       </p:transition>
@@ -6892,10 +7322,10 @@
       </p:sp>
       <p:sp>
         <p:nvSpPr>
-          <p:cNvPr id="4" name="TextBox 3">
-            <a:extLst>
-              <a:ext uri="{FF2B5EF4-FFF2-40B4-BE49-F238E27FC236}">
-                <a16:creationId xmlns:a16="http://schemas.microsoft.com/office/drawing/2014/main" id="{23BA24F5-76E8-48D2-82EA-A56C6E95BABC}"/>
+          <p:cNvPr id="5" name="TextBox 4">
+            <a:extLst>
+              <a:ext uri="{FF2B5EF4-FFF2-40B4-BE49-F238E27FC236}">
+                <a16:creationId xmlns:a16="http://schemas.microsoft.com/office/drawing/2014/main" id="{6BE4DB51-3C77-4F03-AEBA-B16FD219AE66}"/>
               </a:ext>
             </a:extLst>
           </p:cNvPr>
@@ -6905,7 +7335,7 @@
         <p:spPr>
           <a:xfrm>
             <a:off x="5461000" y="1168400"/>
-            <a:ext cx="5873467" cy="2031325"/>
+            <a:ext cx="5296643" cy="2031325"/>
           </a:xfrm>
           <a:prstGeom prst="rect">
             <a:avLst/>
@@ -7079,7 +7509,7 @@
                   </a:schemeClr>
                 </a:solidFill>
               </a:rPr>
-              <a:t>Donate information and Timetable setting is in menu</a:t>
+              <a:t>Donation and Timetable setting is in menu tap</a:t>
             </a:r>
           </a:p>
           <a:p>
@@ -7092,7 +7522,18 @@
                   </a:schemeClr>
                 </a:solidFill>
               </a:rPr>
-              <a:t>You</a:t>
+              <a:t>A</a:t>
+            </a:r>
+            <a:r>
+              <a:rPr lang="en-US" altLang="ko-KR" dirty="0">
+                <a:solidFill>
+                  <a:schemeClr val="tx1">
+                    <a:lumMod val="75000"/>
+                    <a:lumOff val="25000"/>
+                  </a:schemeClr>
+                </a:solidFill>
+              </a:rPr>
+              <a:t>dd</a:t>
             </a:r>
             <a:r>
               <a:rPr lang="ko-KR" altLang="en-US" dirty="0">
@@ -7114,7 +7555,7 @@
                   </a:schemeClr>
                 </a:solidFill>
               </a:rPr>
-              <a:t>can</a:t>
+              <a:t>subjects</a:t>
             </a:r>
             <a:r>
               <a:rPr lang="ko-KR" altLang="en-US" dirty="0">
@@ -7136,51 +7577,7 @@
                   </a:schemeClr>
                 </a:solidFill>
               </a:rPr>
-              <a:t>add</a:t>
-            </a:r>
-            <a:r>
-              <a:rPr lang="ko-KR" altLang="en-US" dirty="0">
-                <a:solidFill>
-                  <a:schemeClr val="tx1">
-                    <a:lumMod val="75000"/>
-                    <a:lumOff val="25000"/>
-                  </a:schemeClr>
-                </a:solidFill>
-              </a:rPr>
-              <a:t> </a:t>
-            </a:r>
-            <a:r>
-              <a:rPr lang="en-US" altLang="ko-KR" dirty="0">
-                <a:solidFill>
-                  <a:schemeClr val="tx1">
-                    <a:lumMod val="75000"/>
-                    <a:lumOff val="25000"/>
-                  </a:schemeClr>
-                </a:solidFill>
-              </a:rPr>
-              <a:t>subjects</a:t>
-            </a:r>
-            <a:r>
-              <a:rPr lang="ko-KR" altLang="en-US" dirty="0">
-                <a:solidFill>
-                  <a:schemeClr val="tx1">
-                    <a:lumMod val="75000"/>
-                    <a:lumOff val="25000"/>
-                  </a:schemeClr>
-                </a:solidFill>
-              </a:rPr>
-              <a:t> </a:t>
-            </a:r>
-            <a:r>
-              <a:rPr lang="en-US" altLang="ko-KR" dirty="0">
-                <a:solidFill>
-                  <a:schemeClr val="tx1">
-                    <a:lumMod val="75000"/>
-                    <a:lumOff val="25000"/>
-                  </a:schemeClr>
-                </a:solidFill>
-              </a:rPr>
-              <a:t>and</a:t>
+              <a:t>or</a:t>
             </a:r>
             <a:r>
               <a:rPr lang="ko-KR" altLang="en-US" dirty="0">
@@ -7225,13 +7622,13 @@
   <p:clrMapOvr>
     <a:masterClrMapping/>
   </p:clrMapOvr>
-  <mc:AlternateContent xmlns:mc="http://schemas.openxmlformats.org/markup-compatibility/2006">
-    <mc:Choice xmlns:p159="http://schemas.microsoft.com/office/powerpoint/2015/09/main" Requires="p159">
+  <mc:AlternateContent xmlns:mc="http://schemas.openxmlformats.org/markup-compatibility/2006" xmlns:p159="http://schemas.microsoft.com/office/powerpoint/2015/09/main">
+    <mc:Choice Requires="p159">
       <p:transition spd="med">
         <p159:morph option="byObject"/>
       </p:transition>
     </mc:Choice>
-    <mc:Fallback>
+    <mc:Fallback xmlns="">
       <p:transition spd="med">
         <p:fade/>
       </p:transition>
@@ -7314,10 +7711,10 @@
       </p:sp>
       <p:sp>
         <p:nvSpPr>
-          <p:cNvPr id="4" name="TextBox 3">
-            <a:extLst>
-              <a:ext uri="{FF2B5EF4-FFF2-40B4-BE49-F238E27FC236}">
-                <a16:creationId xmlns:a16="http://schemas.microsoft.com/office/drawing/2014/main" id="{AF711EB8-814C-42F2-A71B-59804737D1B9}"/>
+          <p:cNvPr id="5" name="TextBox 4">
+            <a:extLst>
+              <a:ext uri="{FF2B5EF4-FFF2-40B4-BE49-F238E27FC236}">
+                <a16:creationId xmlns:a16="http://schemas.microsoft.com/office/drawing/2014/main" id="{82F8D1B6-25DA-472D-A05D-FAA7C4AF472D}"/>
               </a:ext>
             </a:extLst>
           </p:cNvPr>
@@ -7327,7 +7724,7 @@
         <p:spPr>
           <a:xfrm>
             <a:off x="5461000" y="1168400"/>
-            <a:ext cx="5873467" cy="2031325"/>
+            <a:ext cx="5296643" cy="2031325"/>
           </a:xfrm>
           <a:prstGeom prst="rect">
             <a:avLst/>
@@ -7501,7 +7898,7 @@
                   </a:schemeClr>
                 </a:solidFill>
               </a:rPr>
-              <a:t>Donate information and Timetable setting is in menu</a:t>
+              <a:t>Donation and Timetable setting is in menu tap</a:t>
             </a:r>
           </a:p>
           <a:p>
@@ -7514,7 +7911,18 @@
                   </a:schemeClr>
                 </a:solidFill>
               </a:rPr>
-              <a:t>You</a:t>
+              <a:t>A</a:t>
+            </a:r>
+            <a:r>
+              <a:rPr lang="en-US" altLang="ko-KR" dirty="0">
+                <a:solidFill>
+                  <a:schemeClr val="tx1">
+                    <a:lumMod val="75000"/>
+                    <a:lumOff val="25000"/>
+                  </a:schemeClr>
+                </a:solidFill>
+              </a:rPr>
+              <a:t>dd</a:t>
             </a:r>
             <a:r>
               <a:rPr lang="ko-KR" altLang="en-US" dirty="0">
@@ -7536,7 +7944,7 @@
                   </a:schemeClr>
                 </a:solidFill>
               </a:rPr>
-              <a:t>can</a:t>
+              <a:t>subjects</a:t>
             </a:r>
             <a:r>
               <a:rPr lang="ko-KR" altLang="en-US" dirty="0">
@@ -7558,51 +7966,7 @@
                   </a:schemeClr>
                 </a:solidFill>
               </a:rPr>
-              <a:t>add</a:t>
-            </a:r>
-            <a:r>
-              <a:rPr lang="ko-KR" altLang="en-US" dirty="0">
-                <a:solidFill>
-                  <a:schemeClr val="tx1">
-                    <a:lumMod val="75000"/>
-                    <a:lumOff val="25000"/>
-                  </a:schemeClr>
-                </a:solidFill>
-              </a:rPr>
-              <a:t> </a:t>
-            </a:r>
-            <a:r>
-              <a:rPr lang="en-US" altLang="ko-KR" dirty="0">
-                <a:solidFill>
-                  <a:schemeClr val="tx1">
-                    <a:lumMod val="75000"/>
-                    <a:lumOff val="25000"/>
-                  </a:schemeClr>
-                </a:solidFill>
-              </a:rPr>
-              <a:t>subjects</a:t>
-            </a:r>
-            <a:r>
-              <a:rPr lang="ko-KR" altLang="en-US" dirty="0">
-                <a:solidFill>
-                  <a:schemeClr val="tx1">
-                    <a:lumMod val="75000"/>
-                    <a:lumOff val="25000"/>
-                  </a:schemeClr>
-                </a:solidFill>
-              </a:rPr>
-              <a:t> </a:t>
-            </a:r>
-            <a:r>
-              <a:rPr lang="en-US" altLang="ko-KR" dirty="0">
-                <a:solidFill>
-                  <a:schemeClr val="tx1">
-                    <a:lumMod val="75000"/>
-                    <a:lumOff val="25000"/>
-                  </a:schemeClr>
-                </a:solidFill>
-              </a:rPr>
-              <a:t>and</a:t>
+              <a:t>or</a:t>
             </a:r>
             <a:r>
               <a:rPr lang="ko-KR" altLang="en-US" dirty="0">
@@ -7647,13 +8011,13 @@
   <p:clrMapOvr>
     <a:masterClrMapping/>
   </p:clrMapOvr>
-  <mc:AlternateContent xmlns:mc="http://schemas.openxmlformats.org/markup-compatibility/2006">
-    <mc:Choice xmlns:p159="http://schemas.microsoft.com/office/powerpoint/2015/09/main" Requires="p159">
+  <mc:AlternateContent xmlns:mc="http://schemas.openxmlformats.org/markup-compatibility/2006" xmlns:p159="http://schemas.microsoft.com/office/powerpoint/2015/09/main">
+    <mc:Choice Requires="p159">
       <p:transition spd="med">
         <p159:morph option="byObject"/>
       </p:transition>
     </mc:Choice>
-    <mc:Fallback>
+    <mc:Fallback xmlns="">
       <p:transition spd="med">
         <p:fade/>
       </p:transition>
@@ -7736,10 +8100,10 @@
       </p:sp>
       <p:sp>
         <p:nvSpPr>
-          <p:cNvPr id="3" name="TextBox 2">
-            <a:extLst>
-              <a:ext uri="{FF2B5EF4-FFF2-40B4-BE49-F238E27FC236}">
-                <a16:creationId xmlns:a16="http://schemas.microsoft.com/office/drawing/2014/main" id="{6EE5FBDA-112D-4F0F-9AA5-1F53E76C16CD}"/>
+          <p:cNvPr id="4" name="TextBox 3">
+            <a:extLst>
+              <a:ext uri="{FF2B5EF4-FFF2-40B4-BE49-F238E27FC236}">
+                <a16:creationId xmlns:a16="http://schemas.microsoft.com/office/drawing/2014/main" id="{CF02EC8B-1D49-4071-83EB-2E998A907B9D}"/>
               </a:ext>
             </a:extLst>
           </p:cNvPr>
@@ -7749,7 +8113,7 @@
         <p:spPr>
           <a:xfrm>
             <a:off x="5461000" y="1168400"/>
-            <a:ext cx="5873467" cy="2031325"/>
+            <a:ext cx="5296643" cy="2031325"/>
           </a:xfrm>
           <a:prstGeom prst="rect">
             <a:avLst/>
@@ -7923,7 +8287,7 @@
                   </a:schemeClr>
                 </a:solidFill>
               </a:rPr>
-              <a:t>Donate information and Timetable setting is in menu</a:t>
+              <a:t>Donation and Timetable setting is in menu tap</a:t>
             </a:r>
           </a:p>
           <a:p>
@@ -7936,7 +8300,18 @@
                   </a:schemeClr>
                 </a:solidFill>
               </a:rPr>
-              <a:t>You</a:t>
+              <a:t>A</a:t>
+            </a:r>
+            <a:r>
+              <a:rPr lang="en-US" altLang="ko-KR" dirty="0">
+                <a:solidFill>
+                  <a:schemeClr val="tx1">
+                    <a:lumMod val="75000"/>
+                    <a:lumOff val="25000"/>
+                  </a:schemeClr>
+                </a:solidFill>
+              </a:rPr>
+              <a:t>dd</a:t>
             </a:r>
             <a:r>
               <a:rPr lang="ko-KR" altLang="en-US" dirty="0">
@@ -7958,7 +8333,7 @@
                   </a:schemeClr>
                 </a:solidFill>
               </a:rPr>
-              <a:t>can</a:t>
+              <a:t>subjects</a:t>
             </a:r>
             <a:r>
               <a:rPr lang="ko-KR" altLang="en-US" dirty="0">
@@ -7980,51 +8355,7 @@
                   </a:schemeClr>
                 </a:solidFill>
               </a:rPr>
-              <a:t>add</a:t>
-            </a:r>
-            <a:r>
-              <a:rPr lang="ko-KR" altLang="en-US" dirty="0">
-                <a:solidFill>
-                  <a:schemeClr val="tx1">
-                    <a:lumMod val="75000"/>
-                    <a:lumOff val="25000"/>
-                  </a:schemeClr>
-                </a:solidFill>
-              </a:rPr>
-              <a:t> </a:t>
-            </a:r>
-            <a:r>
-              <a:rPr lang="en-US" altLang="ko-KR" dirty="0">
-                <a:solidFill>
-                  <a:schemeClr val="tx1">
-                    <a:lumMod val="75000"/>
-                    <a:lumOff val="25000"/>
-                  </a:schemeClr>
-                </a:solidFill>
-              </a:rPr>
-              <a:t>subjects</a:t>
-            </a:r>
-            <a:r>
-              <a:rPr lang="ko-KR" altLang="en-US" dirty="0">
-                <a:solidFill>
-                  <a:schemeClr val="tx1">
-                    <a:lumMod val="75000"/>
-                    <a:lumOff val="25000"/>
-                  </a:schemeClr>
-                </a:solidFill>
-              </a:rPr>
-              <a:t> </a:t>
-            </a:r>
-            <a:r>
-              <a:rPr lang="en-US" altLang="ko-KR" dirty="0">
-                <a:solidFill>
-                  <a:schemeClr val="tx1">
-                    <a:lumMod val="75000"/>
-                    <a:lumOff val="25000"/>
-                  </a:schemeClr>
-                </a:solidFill>
-              </a:rPr>
-              <a:t>and</a:t>
+              <a:t>or</a:t>
             </a:r>
             <a:r>
               <a:rPr lang="ko-KR" altLang="en-US" dirty="0">
@@ -8069,13 +8400,13 @@
   <p:clrMapOvr>
     <a:masterClrMapping/>
   </p:clrMapOvr>
-  <mc:AlternateContent xmlns:mc="http://schemas.openxmlformats.org/markup-compatibility/2006">
-    <mc:Choice xmlns:p159="http://schemas.microsoft.com/office/powerpoint/2015/09/main" Requires="p159">
+  <mc:AlternateContent xmlns:mc="http://schemas.openxmlformats.org/markup-compatibility/2006" xmlns:p159="http://schemas.microsoft.com/office/powerpoint/2015/09/main">
+    <mc:Choice Requires="p159">
       <p:transition spd="med">
         <p159:morph option="byObject"/>
       </p:transition>
     </mc:Choice>
-    <mc:Fallback>
+    <mc:Fallback xmlns="">
       <p:transition spd="med">
         <p:fade/>
       </p:transition>
@@ -8158,10 +8489,10 @@
       </p:sp>
       <p:sp>
         <p:nvSpPr>
-          <p:cNvPr id="3" name="TextBox 2">
-            <a:extLst>
-              <a:ext uri="{FF2B5EF4-FFF2-40B4-BE49-F238E27FC236}">
-                <a16:creationId xmlns:a16="http://schemas.microsoft.com/office/drawing/2014/main" id="{4688CD47-B9B4-43C4-86A9-CA23986D2703}"/>
+          <p:cNvPr id="4" name="TextBox 3">
+            <a:extLst>
+              <a:ext uri="{FF2B5EF4-FFF2-40B4-BE49-F238E27FC236}">
+                <a16:creationId xmlns:a16="http://schemas.microsoft.com/office/drawing/2014/main" id="{577B5A72-3031-4C1F-86A8-16812F9C7063}"/>
               </a:ext>
             </a:extLst>
           </p:cNvPr>
@@ -8171,7 +8502,7 @@
         <p:spPr>
           <a:xfrm>
             <a:off x="5461000" y="1168400"/>
-            <a:ext cx="5474576" cy="1477328"/>
+            <a:ext cx="5296643" cy="2031325"/>
           </a:xfrm>
           <a:prstGeom prst="rect">
             <a:avLst/>
@@ -8185,17 +8516,6 @@
           <a:lstStyle/>
           <a:p>
             <a:r>
-              <a:rPr lang="ko-KR" altLang="en-US" dirty="0">
-                <a:solidFill>
-                  <a:schemeClr val="tx1">
-                    <a:lumMod val="75000"/>
-                    <a:lumOff val="25000"/>
-                  </a:schemeClr>
-                </a:solidFill>
-              </a:rPr>
-              <a:t>시간표 </a:t>
-            </a:r>
-            <a:r>
               <a:rPr lang="ko-KR" altLang="en-US" dirty="0" err="1">
                 <a:solidFill>
                   <a:schemeClr val="tx1">
@@ -8204,7 +8524,7 @@
                   </a:schemeClr>
                 </a:solidFill>
               </a:rPr>
-              <a:t>설정화면입니다</a:t>
+              <a:t>메인화면입니다</a:t>
             </a:r>
             <a:endParaRPr lang="en-US" altLang="ko-KR" dirty="0">
               <a:solidFill>
@@ -8217,17 +8537,6 @@
           </a:p>
           <a:p>
             <a:r>
-              <a:rPr lang="ko-KR" altLang="en-US" dirty="0" err="1">
-                <a:solidFill>
-                  <a:schemeClr val="tx1">
-                    <a:lumMod val="75000"/>
-                    <a:lumOff val="25000"/>
-                  </a:schemeClr>
-                </a:solidFill>
-              </a:rPr>
-              <a:t>메인화면에서</a:t>
-            </a:r>
-            <a:r>
               <a:rPr lang="ko-KR" altLang="en-US" dirty="0">
                 <a:solidFill>
                   <a:schemeClr val="tx1">
@@ -8236,7 +8545,7 @@
                   </a:schemeClr>
                 </a:solidFill>
               </a:rPr>
-              <a:t> 추가한 과목들로 시간표를 설정합니다</a:t>
+              <a:t>메뉴에서 후원정보와 시간표설정을 할 수 있습니다</a:t>
             </a:r>
             <a:endParaRPr lang="en-US" altLang="ko-KR" dirty="0">
               <a:solidFill>
@@ -8248,6 +8557,27 @@
             </a:endParaRPr>
           </a:p>
           <a:p>
+            <a:r>
+              <a:rPr lang="ko-KR" altLang="en-US" dirty="0">
+                <a:solidFill>
+                  <a:schemeClr val="tx1">
+                    <a:lumMod val="75000"/>
+                    <a:lumOff val="25000"/>
+                  </a:schemeClr>
+                </a:solidFill>
+              </a:rPr>
+              <a:t>추가버튼으로 과목과 사진을 추가 할 수 있습니다</a:t>
+            </a:r>
+            <a:endParaRPr lang="en-US" altLang="ko-KR" dirty="0">
+              <a:solidFill>
+                <a:schemeClr val="tx1">
+                  <a:lumMod val="75000"/>
+                  <a:lumOff val="25000"/>
+                </a:schemeClr>
+              </a:solidFill>
+            </a:endParaRPr>
+          </a:p>
+          <a:p>
             <a:endParaRPr lang="en-US" dirty="0">
               <a:solidFill>
                 <a:schemeClr val="tx1">
@@ -8267,9 +8597,178 @@
                   </a:schemeClr>
                 </a:solidFill>
               </a:rPr>
-              <a:t>This is timetable setup page</a:t>
-            </a:r>
-            <a:endParaRPr lang="en-US" altLang="ko-KR" dirty="0">
+              <a:t>This</a:t>
+            </a:r>
+            <a:r>
+              <a:rPr lang="ko-KR" altLang="en-US" dirty="0">
+                <a:solidFill>
+                  <a:schemeClr val="tx1">
+                    <a:lumMod val="75000"/>
+                    <a:lumOff val="25000"/>
+                  </a:schemeClr>
+                </a:solidFill>
+              </a:rPr>
+              <a:t> </a:t>
+            </a:r>
+            <a:r>
+              <a:rPr lang="en-US" altLang="ko-KR" dirty="0">
+                <a:solidFill>
+                  <a:schemeClr val="tx1">
+                    <a:lumMod val="75000"/>
+                    <a:lumOff val="25000"/>
+                  </a:schemeClr>
+                </a:solidFill>
+              </a:rPr>
+              <a:t>is</a:t>
+            </a:r>
+            <a:r>
+              <a:rPr lang="ko-KR" altLang="en-US" dirty="0">
+                <a:solidFill>
+                  <a:schemeClr val="tx1">
+                    <a:lumMod val="75000"/>
+                    <a:lumOff val="25000"/>
+                  </a:schemeClr>
+                </a:solidFill>
+              </a:rPr>
+              <a:t> </a:t>
+            </a:r>
+            <a:r>
+              <a:rPr lang="en-US" altLang="ko-KR" dirty="0">
+                <a:solidFill>
+                  <a:schemeClr val="tx1">
+                    <a:lumMod val="75000"/>
+                    <a:lumOff val="25000"/>
+                  </a:schemeClr>
+                </a:solidFill>
+              </a:rPr>
+              <a:t>main</a:t>
+            </a:r>
+            <a:r>
+              <a:rPr lang="ko-KR" altLang="en-US" dirty="0">
+                <a:solidFill>
+                  <a:schemeClr val="tx1">
+                    <a:lumMod val="75000"/>
+                    <a:lumOff val="25000"/>
+                  </a:schemeClr>
+                </a:solidFill>
+              </a:rPr>
+              <a:t> </a:t>
+            </a:r>
+            <a:r>
+              <a:rPr lang="en-US" altLang="ko-KR" dirty="0">
+                <a:solidFill>
+                  <a:schemeClr val="tx1">
+                    <a:lumMod val="75000"/>
+                    <a:lumOff val="25000"/>
+                  </a:schemeClr>
+                </a:solidFill>
+              </a:rPr>
+              <a:t>page</a:t>
+            </a:r>
+          </a:p>
+          <a:p>
+            <a:r>
+              <a:rPr lang="en-US" dirty="0">
+                <a:solidFill>
+                  <a:schemeClr val="tx1">
+                    <a:lumMod val="75000"/>
+                    <a:lumOff val="25000"/>
+                  </a:schemeClr>
+                </a:solidFill>
+              </a:rPr>
+              <a:t>Donation and Timetable setting is in menu tap</a:t>
+            </a:r>
+          </a:p>
+          <a:p>
+            <a:r>
+              <a:rPr lang="en-US" dirty="0">
+                <a:solidFill>
+                  <a:schemeClr val="tx1">
+                    <a:lumMod val="75000"/>
+                    <a:lumOff val="25000"/>
+                  </a:schemeClr>
+                </a:solidFill>
+              </a:rPr>
+              <a:t>A</a:t>
+            </a:r>
+            <a:r>
+              <a:rPr lang="en-US" altLang="ko-KR" dirty="0">
+                <a:solidFill>
+                  <a:schemeClr val="tx1">
+                    <a:lumMod val="75000"/>
+                    <a:lumOff val="25000"/>
+                  </a:schemeClr>
+                </a:solidFill>
+              </a:rPr>
+              <a:t>dd</a:t>
+            </a:r>
+            <a:r>
+              <a:rPr lang="ko-KR" altLang="en-US" dirty="0">
+                <a:solidFill>
+                  <a:schemeClr val="tx1">
+                    <a:lumMod val="75000"/>
+                    <a:lumOff val="25000"/>
+                  </a:schemeClr>
+                </a:solidFill>
+              </a:rPr>
+              <a:t> </a:t>
+            </a:r>
+            <a:r>
+              <a:rPr lang="en-US" altLang="ko-KR" dirty="0">
+                <a:solidFill>
+                  <a:schemeClr val="tx1">
+                    <a:lumMod val="75000"/>
+                    <a:lumOff val="25000"/>
+                  </a:schemeClr>
+                </a:solidFill>
+              </a:rPr>
+              <a:t>subjects</a:t>
+            </a:r>
+            <a:r>
+              <a:rPr lang="ko-KR" altLang="en-US" dirty="0">
+                <a:solidFill>
+                  <a:schemeClr val="tx1">
+                    <a:lumMod val="75000"/>
+                    <a:lumOff val="25000"/>
+                  </a:schemeClr>
+                </a:solidFill>
+              </a:rPr>
+              <a:t> </a:t>
+            </a:r>
+            <a:r>
+              <a:rPr lang="en-US" altLang="ko-KR" dirty="0">
+                <a:solidFill>
+                  <a:schemeClr val="tx1">
+                    <a:lumMod val="75000"/>
+                    <a:lumOff val="25000"/>
+                  </a:schemeClr>
+                </a:solidFill>
+              </a:rPr>
+              <a:t>or</a:t>
+            </a:r>
+            <a:r>
+              <a:rPr lang="ko-KR" altLang="en-US" dirty="0">
+                <a:solidFill>
+                  <a:schemeClr val="tx1">
+                    <a:lumMod val="75000"/>
+                    <a:lumOff val="25000"/>
+                  </a:schemeClr>
+                </a:solidFill>
+              </a:rPr>
+              <a:t> </a:t>
+            </a:r>
+            <a:r>
+              <a:rPr lang="en-US" altLang="ko-KR" dirty="0">
+                <a:solidFill>
+                  <a:schemeClr val="tx1">
+                    <a:lumMod val="75000"/>
+                    <a:lumOff val="25000"/>
+                  </a:schemeClr>
+                </a:solidFill>
+              </a:rPr>
+              <a:t>pictures through add button below</a:t>
+            </a:r>
+            <a:endParaRPr lang="en-US" dirty="0">
               <a:solidFill>
                 <a:schemeClr val="tx1">
                   <a:lumMod val="75000"/>
@@ -8277,19 +8776,6 @@
                 </a:schemeClr>
               </a:solidFill>
             </a:endParaRPr>
-          </a:p>
-          <a:p>
-            <a:r>
-              <a:rPr lang="en-US" dirty="0">
-                <a:solidFill>
-                  <a:schemeClr val="tx1">
-                    <a:lumMod val="75000"/>
-                    <a:lumOff val="25000"/>
-                  </a:schemeClr>
-                </a:solidFill>
-              </a:rPr>
-              <a:t>Set your timetable with subjects that you added</a:t>
-            </a:r>
           </a:p>
         </p:txBody>
       </p:sp>
@@ -8303,13 +8789,13 @@
   <p:clrMapOvr>
     <a:masterClrMapping/>
   </p:clrMapOvr>
-  <mc:AlternateContent xmlns:mc="http://schemas.openxmlformats.org/markup-compatibility/2006">
-    <mc:Choice xmlns:p159="http://schemas.microsoft.com/office/powerpoint/2015/09/main" Requires="p159">
+  <mc:AlternateContent xmlns:mc="http://schemas.openxmlformats.org/markup-compatibility/2006" xmlns:p159="http://schemas.microsoft.com/office/powerpoint/2015/09/main">
+    <mc:Choice Requires="p159">
       <p:transition spd="med">
         <p159:morph option="byObject"/>
       </p:transition>
     </mc:Choice>
-    <mc:Fallback>
+    <mc:Fallback xmlns="">
       <p:transition spd="med">
         <p:fade/>
       </p:transition>
@@ -8473,13 +8959,13 @@
   <p:clrMapOvr>
     <a:masterClrMapping/>
   </p:clrMapOvr>
-  <mc:AlternateContent xmlns:mc="http://schemas.openxmlformats.org/markup-compatibility/2006">
-    <mc:Choice xmlns:p159="http://schemas.microsoft.com/office/powerpoint/2015/09/main" Requires="p159">
+  <mc:AlternateContent xmlns:mc="http://schemas.openxmlformats.org/markup-compatibility/2006" xmlns:p159="http://schemas.microsoft.com/office/powerpoint/2015/09/main">
+    <mc:Choice Requires="p159">
       <p:transition spd="med">
         <p159:morph option="byObject"/>
       </p:transition>
     </mc:Choice>
-    <mc:Fallback>
+    <mc:Fallback xmlns="">
       <p:transition spd="med">
         <p:fade/>
       </p:transition>
@@ -8717,13 +9203,13 @@
   <p:clrMapOvr>
     <a:masterClrMapping/>
   </p:clrMapOvr>
-  <mc:AlternateContent xmlns:mc="http://schemas.openxmlformats.org/markup-compatibility/2006">
-    <mc:Choice xmlns:p159="http://schemas.microsoft.com/office/powerpoint/2015/09/main" Requires="p159">
+  <mc:AlternateContent xmlns:mc="http://schemas.openxmlformats.org/markup-compatibility/2006" xmlns:p159="http://schemas.microsoft.com/office/powerpoint/2015/09/main">
+    <mc:Choice Requires="p159">
       <p:transition spd="med">
         <p159:morph option="byObject"/>
       </p:transition>
     </mc:Choice>
-    <mc:Fallback>
+    <mc:Fallback xmlns="">
       <p:transition spd="med">
         <p:fade/>
       </p:transition>

</xml_diff>